<commit_message>
Changed method names and update guide
</commit_message>
<xml_diff>
--- a/Slideshow.pptx
+++ b/Slideshow.pptx
@@ -5,10 +5,10 @@
     <p:sldMasterId id="2147483648" r:id="rId2"/>
   </p:sldMasterIdLst>
   <p:notesMasterIdLst>
-    <p:notesMasterId r:id="rId21"/>
+    <p:notesMasterId r:id="rId22"/>
   </p:notesMasterIdLst>
   <p:handoutMasterIdLst>
-    <p:handoutMasterId r:id="rId22"/>
+    <p:handoutMasterId r:id="rId23"/>
   </p:handoutMasterIdLst>
   <p:sldIdLst>
     <p:sldId id="261" r:id="rId3"/>
@@ -29,6 +29,7 @@
     <p:sldId id="284" r:id="rId18"/>
     <p:sldId id="285" r:id="rId19"/>
     <p:sldId id="286" r:id="rId20"/>
+    <p:sldId id="287" r:id="rId21"/>
   </p:sldIdLst>
   <p:sldSz cx="12192000" cy="6858000"/>
   <p:notesSz cx="6858000" cy="9144000"/>
@@ -231,7 +232,7 @@
           <a:p>
             <a:fld id="{59041DB8-B66F-4DC8-A96E-33677E0F90FF}" type="datetimeFigureOut">
               <a:rPr lang="en-US" smtClean="0"/>
-              <a:t>4/7/2017</a:t>
+              <a:t>5/18/18</a:t>
             </a:fld>
             <a:endParaRPr lang="en-US"/>
           </a:p>
@@ -396,7 +397,7 @@
           <a:p>
             <a:fld id="{DEB49C4A-65AC-492D-9701-81B46C3AD0E4}" type="datetimeFigureOut">
               <a:rPr lang="en-US" smtClean="0"/>
-              <a:t>4/7/2017</a:t>
+              <a:t>5/18/18</a:t>
             </a:fld>
             <a:endParaRPr lang="en-US"/>
           </a:p>
@@ -460,38 +461,37 @@
           <a:p>
             <a:pPr lvl="0"/>
             <a:r>
-              <a:rPr lang="en-US" dirty="0" smtClean="0"/>
+              <a:rPr lang="en-US" dirty="0"/>
               <a:t>Click to edit Master text styles</a:t>
             </a:r>
           </a:p>
           <a:p>
             <a:pPr lvl="1"/>
             <a:r>
-              <a:rPr lang="en-US" dirty="0" smtClean="0"/>
+              <a:rPr lang="en-US" dirty="0"/>
               <a:t>Second level</a:t>
             </a:r>
           </a:p>
           <a:p>
             <a:pPr lvl="2"/>
             <a:r>
-              <a:rPr lang="en-US" dirty="0" smtClean="0"/>
+              <a:rPr lang="en-US" dirty="0"/>
               <a:t>Third level</a:t>
             </a:r>
           </a:p>
           <a:p>
             <a:pPr lvl="3"/>
             <a:r>
-              <a:rPr lang="en-US" dirty="0" smtClean="0"/>
+              <a:rPr lang="en-US" dirty="0"/>
               <a:t>Fourth level</a:t>
             </a:r>
           </a:p>
           <a:p>
             <a:pPr lvl="4"/>
             <a:r>
-              <a:rPr lang="en-US" dirty="0" smtClean="0"/>
+              <a:rPr lang="en-US" dirty="0"/>
               <a:t>Fifth level</a:t>
             </a:r>
-            <a:endParaRPr lang="en-US" dirty="0"/>
           </a:p>
         </p:txBody>
       </p:sp>
@@ -2633,7 +2633,7 @@
           </a:lstStyle>
           <a:p>
             <a:r>
-              <a:rPr lang="fr-FR" smtClean="0"/>
+              <a:rPr lang="fr-FR"/>
               <a:t>Modifiez le style du titre</a:t>
             </a:r>
             <a:endParaRPr lang="en-US" dirty="0"/>
@@ -2707,7 +2707,7 @@
           </a:lstStyle>
           <a:p>
             <a:r>
-              <a:rPr lang="fr-FR" smtClean="0"/>
+              <a:rPr lang="fr-FR"/>
               <a:t>Modifier le style des sous-titres du masque</a:t>
             </a:r>
             <a:endParaRPr lang="en-US"/>
@@ -2803,7 +2803,7 @@
           <a:lstStyle/>
           <a:p>
             <a:r>
-              <a:rPr lang="fr-FR" smtClean="0"/>
+              <a:rPr lang="fr-FR"/>
               <a:t>Modifiez le style du titre</a:t>
             </a:r>
             <a:endParaRPr lang="en-US"/>
@@ -2827,35 +2827,35 @@
           <a:p>
             <a:pPr lvl="0"/>
             <a:r>
-              <a:rPr lang="fr-FR" smtClean="0"/>
+              <a:rPr lang="fr-FR"/>
               <a:t>Modifier les styles du texte du masque</a:t>
             </a:r>
           </a:p>
           <a:p>
             <a:pPr lvl="1"/>
             <a:r>
-              <a:rPr lang="fr-FR" smtClean="0"/>
+              <a:rPr lang="fr-FR"/>
               <a:t>Deuxième niveau</a:t>
             </a:r>
           </a:p>
           <a:p>
             <a:pPr lvl="2"/>
             <a:r>
-              <a:rPr lang="fr-FR" smtClean="0"/>
+              <a:rPr lang="fr-FR"/>
               <a:t>Troisième niveau</a:t>
             </a:r>
           </a:p>
           <a:p>
             <a:pPr lvl="3"/>
             <a:r>
-              <a:rPr lang="fr-FR" smtClean="0"/>
+              <a:rPr lang="fr-FR"/>
               <a:t>Quatrième niveau</a:t>
             </a:r>
           </a:p>
           <a:p>
             <a:pPr lvl="4"/>
             <a:r>
-              <a:rPr lang="fr-FR" smtClean="0"/>
+              <a:rPr lang="fr-FR"/>
               <a:t>Cinquième niveau</a:t>
             </a:r>
             <a:endParaRPr lang="en-US"/>
@@ -2878,7 +2878,7 @@
           <a:lstStyle/>
           <a:p>
             <a:r>
-              <a:rPr lang="fr-FR" smtClean="0"/>
+              <a:rPr lang="fr-FR"/>
               <a:t>07/04/2017</a:t>
             </a:r>
             <a:endParaRPr lang="en-US"/>
@@ -2901,10 +2901,9 @@
           <a:lstStyle/>
           <a:p>
             <a:r>
-              <a:rPr lang="en-US" smtClean="0"/>
+              <a:rPr lang="en-US"/>
               <a:t>Framework Amak</a:t>
             </a:r>
-            <a:endParaRPr lang="en-US"/>
           </a:p>
         </p:txBody>
       </p:sp>
@@ -2994,7 +2993,7 @@
           <a:lstStyle/>
           <a:p>
             <a:r>
-              <a:rPr lang="fr-FR" smtClean="0"/>
+              <a:rPr lang="fr-FR"/>
               <a:t>Modifiez le style du titre</a:t>
             </a:r>
             <a:endParaRPr lang="en-US" dirty="0"/>
@@ -3023,35 +3022,35 @@
           <a:p>
             <a:pPr lvl="0"/>
             <a:r>
-              <a:rPr lang="fr-FR" smtClean="0"/>
+              <a:rPr lang="fr-FR"/>
               <a:t>Modifier les styles du texte du masque</a:t>
             </a:r>
           </a:p>
           <a:p>
             <a:pPr lvl="1"/>
             <a:r>
-              <a:rPr lang="fr-FR" smtClean="0"/>
+              <a:rPr lang="fr-FR"/>
               <a:t>Deuxième niveau</a:t>
             </a:r>
           </a:p>
           <a:p>
             <a:pPr lvl="2"/>
             <a:r>
-              <a:rPr lang="fr-FR" smtClean="0"/>
+              <a:rPr lang="fr-FR"/>
               <a:t>Troisième niveau</a:t>
             </a:r>
           </a:p>
           <a:p>
             <a:pPr lvl="3"/>
             <a:r>
-              <a:rPr lang="fr-FR" smtClean="0"/>
+              <a:rPr lang="fr-FR"/>
               <a:t>Quatrième niveau</a:t>
             </a:r>
           </a:p>
           <a:p>
             <a:pPr lvl="4"/>
             <a:r>
-              <a:rPr lang="fr-FR" smtClean="0"/>
+              <a:rPr lang="fr-FR"/>
               <a:t>Cinquième niveau</a:t>
             </a:r>
             <a:endParaRPr lang="en-US" dirty="0"/>
@@ -3074,7 +3073,7 @@
           <a:lstStyle/>
           <a:p>
             <a:r>
-              <a:rPr lang="fr-FR" smtClean="0"/>
+              <a:rPr lang="fr-FR"/>
               <a:t>07/04/2017</a:t>
             </a:r>
             <a:endParaRPr lang="en-US"/>
@@ -3097,10 +3096,9 @@
           <a:lstStyle/>
           <a:p>
             <a:r>
-              <a:rPr lang="en-US" smtClean="0"/>
+              <a:rPr lang="en-US"/>
               <a:t>Framework Amak</a:t>
             </a:r>
-            <a:endParaRPr lang="en-US"/>
           </a:p>
         </p:txBody>
       </p:sp>
@@ -3185,7 +3183,7 @@
           <a:lstStyle/>
           <a:p>
             <a:r>
-              <a:rPr lang="fr-FR" smtClean="0"/>
+              <a:rPr lang="fr-FR"/>
               <a:t>Modifiez le style du titre</a:t>
             </a:r>
             <a:endParaRPr lang="en-US"/>
@@ -3209,35 +3207,35 @@
           <a:p>
             <a:pPr lvl="0"/>
             <a:r>
-              <a:rPr lang="fr-FR" smtClean="0"/>
+              <a:rPr lang="fr-FR"/>
               <a:t>Modifier les styles du texte du masque</a:t>
             </a:r>
           </a:p>
           <a:p>
             <a:pPr lvl="1"/>
             <a:r>
-              <a:rPr lang="fr-FR" smtClean="0"/>
+              <a:rPr lang="fr-FR"/>
               <a:t>Deuxième niveau</a:t>
             </a:r>
           </a:p>
           <a:p>
             <a:pPr lvl="2"/>
             <a:r>
-              <a:rPr lang="fr-FR" smtClean="0"/>
+              <a:rPr lang="fr-FR"/>
               <a:t>Troisième niveau</a:t>
             </a:r>
           </a:p>
           <a:p>
             <a:pPr lvl="3"/>
             <a:r>
-              <a:rPr lang="fr-FR" smtClean="0"/>
+              <a:rPr lang="fr-FR"/>
               <a:t>Quatrième niveau</a:t>
             </a:r>
           </a:p>
           <a:p>
             <a:pPr lvl="4"/>
             <a:r>
-              <a:rPr lang="fr-FR" smtClean="0"/>
+              <a:rPr lang="fr-FR"/>
               <a:t>Cinquième niveau</a:t>
             </a:r>
             <a:endParaRPr lang="en-US"/>
@@ -3260,7 +3258,7 @@
           <a:lstStyle/>
           <a:p>
             <a:r>
-              <a:rPr lang="fr-FR" smtClean="0"/>
+              <a:rPr lang="fr-FR"/>
               <a:t>07/04/2017</a:t>
             </a:r>
             <a:endParaRPr lang="en-US"/>
@@ -3283,7 +3281,7 @@
           <a:lstStyle/>
           <a:p>
             <a:r>
-              <a:rPr lang="en-US" smtClean="0"/>
+              <a:rPr lang="en-US"/>
               <a:t>Framework Amak</a:t>
             </a:r>
             <a:endParaRPr lang="en-US" dirty="0"/>
@@ -5233,7 +5231,7 @@
           </a:lstStyle>
           <a:p>
             <a:r>
-              <a:rPr lang="fr-FR" smtClean="0"/>
+              <a:rPr lang="fr-FR"/>
               <a:t>Modifiez le style du titre</a:t>
             </a:r>
             <a:endParaRPr lang="en-US" dirty="0"/>
@@ -5308,7 +5306,7 @@
           <a:p>
             <a:pPr lvl="0"/>
             <a:r>
-              <a:rPr lang="fr-FR" smtClean="0"/>
+              <a:rPr lang="fr-FR"/>
               <a:t>Modifier les styles du texte du masque</a:t>
             </a:r>
           </a:p>
@@ -5407,7 +5405,7 @@
           <a:lstStyle/>
           <a:p>
             <a:r>
-              <a:rPr lang="fr-FR" smtClean="0"/>
+              <a:rPr lang="fr-FR"/>
               <a:t>Modifiez le style du titre</a:t>
             </a:r>
             <a:endParaRPr lang="en-US"/>
@@ -5466,35 +5464,35 @@
           <a:p>
             <a:pPr lvl="0"/>
             <a:r>
-              <a:rPr lang="fr-FR" smtClean="0"/>
+              <a:rPr lang="fr-FR"/>
               <a:t>Modifier les styles du texte du masque</a:t>
             </a:r>
           </a:p>
           <a:p>
             <a:pPr lvl="1"/>
             <a:r>
-              <a:rPr lang="fr-FR" smtClean="0"/>
+              <a:rPr lang="fr-FR"/>
               <a:t>Deuxième niveau</a:t>
             </a:r>
           </a:p>
           <a:p>
             <a:pPr lvl="2"/>
             <a:r>
-              <a:rPr lang="fr-FR" smtClean="0"/>
+              <a:rPr lang="fr-FR"/>
               <a:t>Troisième niveau</a:t>
             </a:r>
           </a:p>
           <a:p>
             <a:pPr lvl="3"/>
             <a:r>
-              <a:rPr lang="fr-FR" smtClean="0"/>
+              <a:rPr lang="fr-FR"/>
               <a:t>Quatrième niveau</a:t>
             </a:r>
           </a:p>
           <a:p>
             <a:pPr lvl="4"/>
             <a:r>
-              <a:rPr lang="fr-FR" smtClean="0"/>
+              <a:rPr lang="fr-FR"/>
               <a:t>Cinquième niveau</a:t>
             </a:r>
             <a:endParaRPr lang="en-US" dirty="0"/>
@@ -5553,35 +5551,35 @@
           <a:p>
             <a:pPr lvl="0"/>
             <a:r>
-              <a:rPr lang="fr-FR" smtClean="0"/>
+              <a:rPr lang="fr-FR"/>
               <a:t>Modifier les styles du texte du masque</a:t>
             </a:r>
           </a:p>
           <a:p>
             <a:pPr lvl="1"/>
             <a:r>
-              <a:rPr lang="fr-FR" smtClean="0"/>
+              <a:rPr lang="fr-FR"/>
               <a:t>Deuxième niveau</a:t>
             </a:r>
           </a:p>
           <a:p>
             <a:pPr lvl="2"/>
             <a:r>
-              <a:rPr lang="fr-FR" smtClean="0"/>
+              <a:rPr lang="fr-FR"/>
               <a:t>Troisième niveau</a:t>
             </a:r>
           </a:p>
           <a:p>
             <a:pPr lvl="3"/>
             <a:r>
-              <a:rPr lang="fr-FR" smtClean="0"/>
+              <a:rPr lang="fr-FR"/>
               <a:t>Quatrième niveau</a:t>
             </a:r>
           </a:p>
           <a:p>
             <a:pPr lvl="4"/>
             <a:r>
-              <a:rPr lang="fr-FR" smtClean="0"/>
+              <a:rPr lang="fr-FR"/>
               <a:t>Cinquième niveau</a:t>
             </a:r>
             <a:endParaRPr lang="en-US"/>
@@ -5604,7 +5602,7 @@
           <a:lstStyle/>
           <a:p>
             <a:r>
-              <a:rPr lang="fr-FR" smtClean="0"/>
+              <a:rPr lang="fr-FR"/>
               <a:t>07/04/2017</a:t>
             </a:r>
             <a:endParaRPr lang="en-US"/>
@@ -5627,7 +5625,7 @@
           <a:lstStyle/>
           <a:p>
             <a:r>
-              <a:rPr lang="en-US" smtClean="0"/>
+              <a:rPr lang="en-US"/>
               <a:t>Framework Amak</a:t>
             </a:r>
             <a:endParaRPr lang="en-US" dirty="0"/>
@@ -5715,7 +5713,7 @@
           <a:lstStyle/>
           <a:p>
             <a:r>
-              <a:rPr lang="fr-FR" smtClean="0"/>
+              <a:rPr lang="fr-FR"/>
               <a:t>Modifiez le style du titre</a:t>
             </a:r>
             <a:endParaRPr lang="en-US"/>
@@ -5790,7 +5788,7 @@
           <a:p>
             <a:pPr lvl="0"/>
             <a:r>
-              <a:rPr lang="fr-FR" smtClean="0"/>
+              <a:rPr lang="fr-FR"/>
               <a:t>Modifier les styles du texte du masque</a:t>
             </a:r>
           </a:p>
@@ -5848,35 +5846,35 @@
           <a:p>
             <a:pPr lvl="0"/>
             <a:r>
-              <a:rPr lang="fr-FR" smtClean="0"/>
+              <a:rPr lang="fr-FR"/>
               <a:t>Modifier les styles du texte du masque</a:t>
             </a:r>
           </a:p>
           <a:p>
             <a:pPr lvl="1"/>
             <a:r>
-              <a:rPr lang="fr-FR" smtClean="0"/>
+              <a:rPr lang="fr-FR"/>
               <a:t>Deuxième niveau</a:t>
             </a:r>
           </a:p>
           <a:p>
             <a:pPr lvl="2"/>
             <a:r>
-              <a:rPr lang="fr-FR" smtClean="0"/>
+              <a:rPr lang="fr-FR"/>
               <a:t>Troisième niveau</a:t>
             </a:r>
           </a:p>
           <a:p>
             <a:pPr lvl="3"/>
             <a:r>
-              <a:rPr lang="fr-FR" smtClean="0"/>
+              <a:rPr lang="fr-FR"/>
               <a:t>Quatrième niveau</a:t>
             </a:r>
           </a:p>
           <a:p>
             <a:pPr lvl="4"/>
             <a:r>
-              <a:rPr lang="fr-FR" smtClean="0"/>
+              <a:rPr lang="fr-FR"/>
               <a:t>Cinquième niveau</a:t>
             </a:r>
             <a:endParaRPr lang="en-US" dirty="0"/>
@@ -5951,7 +5949,7 @@
           <a:p>
             <a:pPr lvl="0"/>
             <a:r>
-              <a:rPr lang="fr-FR" smtClean="0"/>
+              <a:rPr lang="fr-FR"/>
               <a:t>Modifier les styles du texte du masque</a:t>
             </a:r>
           </a:p>
@@ -6009,35 +6007,35 @@
           <a:p>
             <a:pPr lvl="0"/>
             <a:r>
-              <a:rPr lang="fr-FR" smtClean="0"/>
+              <a:rPr lang="fr-FR"/>
               <a:t>Modifier les styles du texte du masque</a:t>
             </a:r>
           </a:p>
           <a:p>
             <a:pPr lvl="1"/>
             <a:r>
-              <a:rPr lang="fr-FR" smtClean="0"/>
+              <a:rPr lang="fr-FR"/>
               <a:t>Deuxième niveau</a:t>
             </a:r>
           </a:p>
           <a:p>
             <a:pPr lvl="2"/>
             <a:r>
-              <a:rPr lang="fr-FR" smtClean="0"/>
+              <a:rPr lang="fr-FR"/>
               <a:t>Troisième niveau</a:t>
             </a:r>
           </a:p>
           <a:p>
             <a:pPr lvl="3"/>
             <a:r>
-              <a:rPr lang="fr-FR" smtClean="0"/>
+              <a:rPr lang="fr-FR"/>
               <a:t>Quatrième niveau</a:t>
             </a:r>
           </a:p>
           <a:p>
             <a:pPr lvl="4"/>
             <a:r>
-              <a:rPr lang="fr-FR" smtClean="0"/>
+              <a:rPr lang="fr-FR"/>
               <a:t>Cinquième niveau</a:t>
             </a:r>
             <a:endParaRPr lang="en-US"/>
@@ -6060,7 +6058,7 @@
           <a:lstStyle/>
           <a:p>
             <a:r>
-              <a:rPr lang="fr-FR" smtClean="0"/>
+              <a:rPr lang="fr-FR"/>
               <a:t>07/04/2017</a:t>
             </a:r>
             <a:endParaRPr lang="en-US"/>
@@ -6083,10 +6081,9 @@
           <a:lstStyle/>
           <a:p>
             <a:r>
-              <a:rPr lang="en-US" smtClean="0"/>
+              <a:rPr lang="en-US"/>
               <a:t>Framework Amak</a:t>
             </a:r>
-            <a:endParaRPr lang="en-US"/>
           </a:p>
         </p:txBody>
       </p:sp>
@@ -6171,7 +6168,7 @@
           <a:lstStyle/>
           <a:p>
             <a:r>
-              <a:rPr lang="fr-FR" smtClean="0"/>
+              <a:rPr lang="fr-FR"/>
               <a:t>Modifiez le style du titre</a:t>
             </a:r>
             <a:endParaRPr lang="en-US"/>
@@ -6194,7 +6191,7 @@
           <a:lstStyle/>
           <a:p>
             <a:r>
-              <a:rPr lang="fr-FR" smtClean="0"/>
+              <a:rPr lang="fr-FR"/>
               <a:t>07/04/2017</a:t>
             </a:r>
             <a:endParaRPr lang="en-US"/>
@@ -6217,10 +6214,9 @@
           <a:lstStyle/>
           <a:p>
             <a:r>
-              <a:rPr lang="en-US" smtClean="0"/>
+              <a:rPr lang="en-US"/>
               <a:t>Framework Amak</a:t>
             </a:r>
-            <a:endParaRPr lang="en-US"/>
           </a:p>
         </p:txBody>
       </p:sp>
@@ -8128,7 +8124,7 @@
           <a:lstStyle/>
           <a:p>
             <a:r>
-              <a:rPr lang="fr-FR" smtClean="0"/>
+              <a:rPr lang="fr-FR"/>
               <a:t>07/04/2017</a:t>
             </a:r>
             <a:endParaRPr lang="en-US"/>
@@ -8151,7 +8147,7 @@
           <a:lstStyle/>
           <a:p>
             <a:r>
-              <a:rPr lang="en-US" smtClean="0"/>
+              <a:rPr lang="en-US"/>
               <a:t>Framework Amak</a:t>
             </a:r>
             <a:endParaRPr lang="en-US" dirty="0"/>
@@ -10160,7 +10156,7 @@
           </a:lstStyle>
           <a:p>
             <a:r>
-              <a:rPr lang="fr-FR" smtClean="0"/>
+              <a:rPr lang="fr-FR"/>
               <a:t>Modifiez le style du titre</a:t>
             </a:r>
             <a:endParaRPr lang="en-US" dirty="0"/>
@@ -10219,35 +10215,35 @@
           <a:p>
             <a:pPr lvl="0"/>
             <a:r>
-              <a:rPr lang="fr-FR" smtClean="0"/>
+              <a:rPr lang="fr-FR"/>
               <a:t>Modifier les styles du texte du masque</a:t>
             </a:r>
           </a:p>
           <a:p>
             <a:pPr lvl="1"/>
             <a:r>
-              <a:rPr lang="fr-FR" smtClean="0"/>
+              <a:rPr lang="fr-FR"/>
               <a:t>Deuxième niveau</a:t>
             </a:r>
           </a:p>
           <a:p>
             <a:pPr lvl="2"/>
             <a:r>
-              <a:rPr lang="fr-FR" smtClean="0"/>
+              <a:rPr lang="fr-FR"/>
               <a:t>Troisième niveau</a:t>
             </a:r>
           </a:p>
           <a:p>
             <a:pPr lvl="3"/>
             <a:r>
-              <a:rPr lang="fr-FR" smtClean="0"/>
+              <a:rPr lang="fr-FR"/>
               <a:t>Quatrième niveau</a:t>
             </a:r>
           </a:p>
           <a:p>
             <a:pPr lvl="4"/>
             <a:r>
-              <a:rPr lang="fr-FR" smtClean="0"/>
+              <a:rPr lang="fr-FR"/>
               <a:t>Cinquième niveau</a:t>
             </a:r>
             <a:endParaRPr lang="en-US" dirty="0"/>
@@ -10322,7 +10318,7 @@
           <a:p>
             <a:pPr lvl="0"/>
             <a:r>
-              <a:rPr lang="fr-FR" smtClean="0"/>
+              <a:rPr lang="fr-FR"/>
               <a:t>Modifier les styles du texte du masque</a:t>
             </a:r>
           </a:p>
@@ -10379,7 +10375,7 @@
           <a:lstStyle/>
           <a:p>
             <a:r>
-              <a:rPr lang="fr-FR" smtClean="0"/>
+              <a:rPr lang="fr-FR"/>
               <a:t>07/04/2017</a:t>
             </a:r>
             <a:endParaRPr lang="en-US"/>
@@ -10402,7 +10398,7 @@
           <a:lstStyle/>
           <a:p>
             <a:r>
-              <a:rPr lang="en-US" smtClean="0"/>
+              <a:rPr lang="en-US"/>
               <a:t>Framework Amak</a:t>
             </a:r>
             <a:endParaRPr lang="en-US" dirty="0"/>
@@ -12440,7 +12436,7 @@
           </a:lstStyle>
           <a:p>
             <a:r>
-              <a:rPr lang="fr-FR" smtClean="0"/>
+              <a:rPr lang="fr-FR"/>
               <a:t>Cliquez sur l'icône pour ajouter une image</a:t>
             </a:r>
             <a:endParaRPr lang="en-US"/>
@@ -12513,7 +12509,7 @@
           </a:lstStyle>
           <a:p>
             <a:r>
-              <a:rPr lang="fr-FR" smtClean="0"/>
+              <a:rPr lang="fr-FR"/>
               <a:t>Modifiez le style du titre</a:t>
             </a:r>
             <a:endParaRPr lang="en-US"/>
@@ -12586,7 +12582,7 @@
           <a:p>
             <a:pPr lvl="0"/>
             <a:r>
-              <a:rPr lang="fr-FR" smtClean="0"/>
+              <a:rPr lang="fr-FR"/>
               <a:t>Modifier les styles du texte du masque</a:t>
             </a:r>
           </a:p>
@@ -14508,7 +14504,7 @@
           <a:lstStyle/>
           <a:p>
             <a:r>
-              <a:rPr lang="fr-FR" smtClean="0"/>
+              <a:rPr lang="fr-FR"/>
               <a:t>Modifiez le style du titre</a:t>
             </a:r>
             <a:endParaRPr lang="en-US" dirty="0"/>
@@ -14542,38 +14538,38 @@
           <a:p>
             <a:pPr lvl="0"/>
             <a:r>
-              <a:rPr lang="fr-FR" smtClean="0"/>
+              <a:rPr lang="fr-FR"/>
               <a:t>Modifier les styles du texte du masque</a:t>
             </a:r>
           </a:p>
           <a:p>
             <a:pPr lvl="1"/>
             <a:r>
-              <a:rPr lang="fr-FR" smtClean="0"/>
+              <a:rPr lang="fr-FR"/>
               <a:t>Deuxième niveau</a:t>
             </a:r>
           </a:p>
           <a:p>
             <a:pPr lvl="2"/>
             <a:r>
-              <a:rPr lang="fr-FR" smtClean="0"/>
+              <a:rPr lang="fr-FR"/>
               <a:t>Troisième niveau</a:t>
             </a:r>
           </a:p>
           <a:p>
             <a:pPr lvl="3"/>
             <a:r>
-              <a:rPr lang="fr-FR" smtClean="0"/>
+              <a:rPr lang="fr-FR"/>
               <a:t>Quatrième niveau</a:t>
             </a:r>
           </a:p>
           <a:p>
             <a:pPr lvl="4"/>
             <a:r>
-              <a:rPr lang="fr-FR" smtClean="0"/>
+              <a:rPr lang="fr-FR"/>
               <a:t>Cinquième niveau</a:t>
             </a:r>
-            <a:endParaRPr lang="en-US" dirty="0" smtClean="0"/>
+            <a:endParaRPr lang="en-US" dirty="0"/>
           </a:p>
         </p:txBody>
       </p:sp>
@@ -14612,7 +14608,7 @@
           </a:lstStyle>
           <a:p>
             <a:r>
-              <a:rPr lang="fr-FR" smtClean="0"/>
+              <a:rPr lang="fr-FR"/>
               <a:t>07/04/2017</a:t>
             </a:r>
             <a:endParaRPr lang="en-US"/>
@@ -14654,7 +14650,7 @@
           </a:lstStyle>
           <a:p>
             <a:r>
-              <a:rPr lang="en-US" smtClean="0"/>
+              <a:rPr lang="en-US"/>
               <a:t>Framework Amak</a:t>
             </a:r>
             <a:endParaRPr lang="en-US" dirty="0"/>
@@ -15139,10 +15135,9 @@
           <a:lstStyle/>
           <a:p>
             <a:r>
-              <a:rPr lang="fr-FR" noProof="1" smtClean="0"/>
-              <a:t>Framework Amak</a:t>
-            </a:r>
-            <a:endParaRPr lang="fr-FR" noProof="1"/>
+              <a:rPr lang="fr-FR" noProof="1"/>
+              <a:t>AMAK Framework</a:t>
+            </a:r>
           </a:p>
         </p:txBody>
       </p:sp>
@@ -15164,11 +15159,11 @@
           <a:lstStyle/>
           <a:p>
             <a:r>
-              <a:rPr lang="fr-FR" dirty="0" smtClean="0"/>
+              <a:rPr lang="fr-FR" dirty="0"/>
               <a:t>A Multi-Agent </a:t>
             </a:r>
             <a:r>
-              <a:rPr lang="fr-FR" dirty="0" err="1" smtClean="0"/>
+              <a:rPr lang="fr-FR" dirty="0" err="1"/>
               <a:t>frameworK</a:t>
             </a:r>
             <a:endParaRPr lang="fr-FR" dirty="0"/>
@@ -15197,13 +15192,6 @@
       </p:transition>
     </mc:Fallback>
   </mc:AlternateContent>
-  <p:timing>
-    <p:tnLst>
-      <p:par>
-        <p:cTn id="1" dur="indefinite" restart="never" nodeType="tmRoot"/>
-      </p:par>
-    </p:tnLst>
-  </p:timing>
 </p:sld>
 </file>
 
@@ -15240,10 +15228,9 @@
           <a:lstStyle/>
           <a:p>
             <a:r>
-              <a:rPr lang="fr-FR" dirty="0" smtClean="0"/>
+              <a:rPr lang="fr-FR" dirty="0"/>
               <a:t>Librairies et outils intégrés</a:t>
             </a:r>
-            <a:endParaRPr lang="fr-FR" dirty="0"/>
           </a:p>
         </p:txBody>
       </p:sp>
@@ -15260,106 +15247,86 @@
         <p:spPr/>
         <p:txBody>
           <a:bodyPr>
-            <a:normAutofit fontScale="77500" lnSpcReduction="20000"/>
+            <a:normAutofit fontScale="92500" lnSpcReduction="20000"/>
           </a:bodyPr>
           <a:lstStyle/>
           <a:p>
             <a:r>
-              <a:rPr lang="fr-FR" dirty="0" err="1" smtClean="0"/>
+              <a:rPr lang="fr-FR" dirty="0" err="1"/>
               <a:t>LxPlot</a:t>
             </a:r>
             <a:r>
-              <a:rPr lang="fr-FR" dirty="0" smtClean="0"/>
+              <a:rPr lang="fr-FR" dirty="0"/>
               <a:t> : Permet de tracer des graphiques en une ligne de code</a:t>
             </a:r>
           </a:p>
           <a:p>
             <a:r>
-              <a:rPr lang="fr-FR" dirty="0" smtClean="0"/>
+              <a:rPr lang="fr-FR" dirty="0"/>
               <a:t>AVT : Adaptive Value </a:t>
             </a:r>
             <a:r>
-              <a:rPr lang="fr-FR" dirty="0" err="1" smtClean="0"/>
+              <a:rPr lang="fr-FR" dirty="0" err="1"/>
               <a:t>Tracker</a:t>
             </a:r>
-            <a:endParaRPr lang="fr-FR" dirty="0" smtClean="0"/>
-          </a:p>
-          <a:p>
-            <a:r>
-              <a:rPr lang="fr-FR" dirty="0" smtClean="0"/>
+            <a:endParaRPr lang="fr-FR" dirty="0"/>
+          </a:p>
+          <a:p>
+            <a:r>
+              <a:rPr lang="fr-FR" dirty="0"/>
               <a:t>Log : Système de journal simplifié</a:t>
             </a:r>
           </a:p>
           <a:p>
             <a:r>
-              <a:rPr lang="fr-FR" dirty="0" smtClean="0"/>
+              <a:rPr lang="fr-FR" dirty="0"/>
               <a:t>Profiler : Système de </a:t>
             </a:r>
             <a:r>
-              <a:rPr lang="fr-FR" dirty="0" err="1" smtClean="0"/>
+              <a:rPr lang="fr-FR" dirty="0" err="1"/>
               <a:t>profiling</a:t>
             </a:r>
             <a:r>
-              <a:rPr lang="fr-FR" dirty="0" smtClean="0"/>
+              <a:rPr lang="fr-FR" dirty="0"/>
               <a:t> simplifié</a:t>
             </a:r>
           </a:p>
           <a:p>
             <a:r>
-              <a:rPr lang="fr-FR" dirty="0" err="1" smtClean="0"/>
-              <a:t>DrawableUI</a:t>
-            </a:r>
-            <a:r>
-              <a:rPr lang="fr-FR" dirty="0" smtClean="0"/>
-              <a:t> : Classe </a:t>
-            </a:r>
-            <a:r>
-              <a:rPr lang="fr-FR" dirty="0" err="1" smtClean="0"/>
-              <a:t>surchargeable</a:t>
-            </a:r>
-            <a:r>
-              <a:rPr lang="fr-FR" dirty="0" smtClean="0"/>
-              <a:t> permettant de dessiner sur un </a:t>
-            </a:r>
-            <a:r>
-              <a:rPr lang="fr-FR" dirty="0" err="1" smtClean="0"/>
-              <a:t>canvas</a:t>
-            </a:r>
-            <a:r>
-              <a:rPr lang="fr-FR" dirty="0" smtClean="0"/>
-              <a:t> facilement sans altérer la vitesse d’exécution</a:t>
-            </a:r>
-          </a:p>
-          <a:p>
-            <a:r>
-              <a:rPr lang="fr-FR" dirty="0" err="1" smtClean="0"/>
+              <a:rPr lang="fr-FR" dirty="0"/>
+              <a:t>VUI : Classe permettant un affichage de formes simples</a:t>
+            </a:r>
+          </a:p>
+          <a:p>
+            <a:r>
+              <a:rPr lang="fr-FR" dirty="0" err="1"/>
               <a:t>ToolbarWindow</a:t>
             </a:r>
             <a:r>
-              <a:rPr lang="fr-FR" dirty="0" smtClean="0"/>
+              <a:rPr lang="fr-FR" dirty="0"/>
               <a:t> : Fenêtre permettant de gérer des </a:t>
             </a:r>
             <a:r>
-              <a:rPr lang="fr-FR" dirty="0" err="1" smtClean="0"/>
+              <a:rPr lang="fr-FR" dirty="0" err="1"/>
               <a:t>toolbars</a:t>
             </a:r>
-            <a:endParaRPr lang="fr-FR" dirty="0" smtClean="0"/>
-          </a:p>
-          <a:p>
-            <a:r>
-              <a:rPr lang="fr-FR" dirty="0" err="1" smtClean="0"/>
+            <a:endParaRPr lang="fr-FR" dirty="0"/>
+          </a:p>
+          <a:p>
+            <a:r>
+              <a:rPr lang="fr-FR" dirty="0" err="1"/>
               <a:t>Scheduler</a:t>
             </a:r>
             <a:r>
-              <a:rPr lang="fr-FR" dirty="0" smtClean="0"/>
+              <a:rPr lang="fr-FR" dirty="0"/>
               <a:t> </a:t>
             </a:r>
             <a:r>
-              <a:rPr lang="fr-FR" dirty="0" err="1" smtClean="0"/>
+              <a:rPr lang="fr-FR" dirty="0" err="1"/>
               <a:t>toolbar</a:t>
             </a:r>
             <a:r>
-              <a:rPr lang="fr-FR" dirty="0" smtClean="0"/>
+              <a:rPr lang="fr-FR" dirty="0"/>
               <a:t> : IHM permettant de contrôler l’exécution d’un système</a:t>
             </a:r>
           </a:p>
@@ -15378,29 +15345,28 @@
         <p:spPr/>
         <p:txBody>
           <a:bodyPr>
-            <a:normAutofit fontScale="77500" lnSpcReduction="20000"/>
+            <a:normAutofit fontScale="92500" lnSpcReduction="20000"/>
           </a:bodyPr>
           <a:lstStyle/>
           <a:p>
             <a:r>
-              <a:rPr lang="fr-FR" dirty="0" smtClean="0"/>
+              <a:rPr lang="fr-FR" dirty="0"/>
               <a:t>À venir</a:t>
             </a:r>
           </a:p>
           <a:p>
             <a:pPr lvl="1"/>
             <a:r>
-              <a:rPr lang="fr-FR" dirty="0" smtClean="0"/>
+              <a:rPr lang="fr-FR" dirty="0"/>
               <a:t>Links : Outil de visualisation d’un ensemble d’agents et de leurs relations</a:t>
             </a:r>
           </a:p>
           <a:p>
             <a:pPr lvl="1"/>
             <a:r>
-              <a:rPr lang="fr-FR" dirty="0" smtClean="0"/>
+              <a:rPr lang="fr-FR" dirty="0"/>
               <a:t>…</a:t>
             </a:r>
-            <a:endParaRPr lang="fr-FR" dirty="0"/>
           </a:p>
         </p:txBody>
       </p:sp>
@@ -15450,7 +15416,7 @@
           <a:lstStyle/>
           <a:p>
             <a:r>
-              <a:rPr lang="fr-FR" smtClean="0"/>
+              <a:rPr lang="fr-FR"/>
               <a:t>07/04/2017</a:t>
             </a:r>
             <a:endParaRPr lang="en-US"/>
@@ -15473,7 +15439,7 @@
           <a:lstStyle/>
           <a:p>
             <a:r>
-              <a:rPr lang="en-US" smtClean="0"/>
+              <a:rPr lang="en-US"/>
               <a:t>Framework Amak</a:t>
             </a:r>
             <a:endParaRPr lang="en-US" dirty="0"/>
@@ -15525,13 +15491,6 @@
       </p:transition>
     </mc:Fallback>
   </mc:AlternateContent>
-  <p:timing>
-    <p:tnLst>
-      <p:par>
-        <p:cTn id="1" dur="indefinite" restart="never" nodeType="tmRoot"/>
-      </p:par>
-    </p:tnLst>
-  </p:timing>
 </p:sld>
 </file>
 
@@ -15568,15 +15527,15 @@
           <a:lstStyle/>
           <a:p>
             <a:r>
-              <a:rPr lang="en-US" dirty="0" err="1" smtClean="0"/>
+              <a:rPr lang="en-US" dirty="0" err="1"/>
               <a:t>Exemple</a:t>
             </a:r>
             <a:r>
-              <a:rPr lang="en-US" dirty="0" smtClean="0"/>
+              <a:rPr lang="en-US" dirty="0"/>
               <a:t> </a:t>
             </a:r>
             <a:r>
-              <a:rPr lang="en-US" dirty="0" err="1" smtClean="0"/>
+              <a:rPr lang="en-US" dirty="0" err="1"/>
               <a:t>d’utilisation</a:t>
             </a:r>
             <a:endParaRPr lang="fr-FR" dirty="0"/>
@@ -15599,7 +15558,7 @@
           <a:lstStyle/>
           <a:p>
             <a:r>
-              <a:rPr lang="fr-FR" dirty="0" smtClean="0"/>
+              <a:rPr lang="fr-FR" dirty="0"/>
               <a:t>Diner des philosophes</a:t>
             </a:r>
           </a:p>
@@ -15607,127 +15566,115 @@
             <a:pPr lvl="1"/>
             <a:r>
               <a:rPr lang="fr-FR" dirty="0"/>
-              <a:t>X</a:t>
-            </a:r>
-            <a:r>
-              <a:rPr lang="fr-FR" dirty="0" smtClean="0"/>
+              <a:t>X philosophes assis autour d’une table</a:t>
+            </a:r>
+          </a:p>
+          <a:p>
+            <a:pPr lvl="1"/>
+            <a:r>
+              <a:rPr lang="en-US" dirty="0"/>
+              <a:t>X </a:t>
+            </a:r>
+            <a:r>
+              <a:rPr lang="en-US" dirty="0" err="1"/>
+              <a:t>fourchettes</a:t>
+            </a:r>
+            <a:r>
+              <a:rPr lang="en-US" dirty="0"/>
+              <a:t> sur la table</a:t>
+            </a:r>
+          </a:p>
+          <a:p>
+            <a:pPr lvl="1"/>
+            <a:r>
+              <a:rPr lang="en-US" dirty="0"/>
+              <a:t>Pour manger, </a:t>
+            </a:r>
+            <a:r>
+              <a:rPr lang="en-US" dirty="0" err="1"/>
+              <a:t>il</a:t>
+            </a:r>
+            <a:r>
+              <a:rPr lang="en-US" dirty="0"/>
               <a:t> </a:t>
             </a:r>
             <a:r>
-              <a:rPr lang="fr-FR" dirty="0" smtClean="0"/>
-              <a:t>philosophes assis autour d’une table</a:t>
-            </a:r>
+              <a:rPr lang="en-US" dirty="0" err="1"/>
+              <a:t>leur</a:t>
+            </a:r>
+            <a:r>
+              <a:rPr lang="en-US" dirty="0"/>
+              <a:t> </a:t>
+            </a:r>
+            <a:r>
+              <a:rPr lang="en-US" dirty="0" err="1"/>
+              <a:t>faut</a:t>
+            </a:r>
+            <a:r>
+              <a:rPr lang="en-US" dirty="0"/>
+              <a:t> </a:t>
+            </a:r>
+            <a:r>
+              <a:rPr lang="en-US" dirty="0" err="1"/>
+              <a:t>deux</a:t>
+            </a:r>
+            <a:r>
+              <a:rPr lang="en-US" dirty="0"/>
+              <a:t> </a:t>
+            </a:r>
+            <a:r>
+              <a:rPr lang="en-US" dirty="0" err="1"/>
+              <a:t>fourchettes</a:t>
+            </a:r>
+            <a:endParaRPr lang="en-US" dirty="0"/>
           </a:p>
           <a:p>
             <a:pPr lvl="1"/>
             <a:r>
+              <a:rPr lang="en-US" dirty="0" err="1"/>
+              <a:t>Ils</a:t>
+            </a:r>
+            <a:r>
               <a:rPr lang="en-US" dirty="0"/>
-              <a:t>X</a:t>
-            </a:r>
-            <a:r>
-              <a:rPr lang="en-US" dirty="0" smtClean="0"/>
               <a:t> </a:t>
             </a:r>
             <a:r>
-              <a:rPr lang="en-US" dirty="0" err="1" smtClean="0"/>
-              <a:t>fourchettes</a:t>
-            </a:r>
-            <a:r>
-              <a:rPr lang="en-US" dirty="0" smtClean="0"/>
-              <a:t> sur la table</a:t>
-            </a:r>
-          </a:p>
-          <a:p>
-            <a:pPr lvl="1"/>
-            <a:r>
-              <a:rPr lang="en-US" dirty="0" smtClean="0"/>
-              <a:t>Pour manger, </a:t>
-            </a:r>
-            <a:r>
-              <a:rPr lang="en-US" dirty="0" err="1" smtClean="0"/>
-              <a:t>il</a:t>
-            </a:r>
-            <a:r>
-              <a:rPr lang="en-US" dirty="0" smtClean="0"/>
+              <a:rPr lang="en-US" dirty="0" err="1"/>
+              <a:t>doivent</a:t>
+            </a:r>
+            <a:r>
+              <a:rPr lang="en-US" dirty="0"/>
               <a:t> </a:t>
             </a:r>
             <a:r>
-              <a:rPr lang="en-US" dirty="0" err="1" smtClean="0"/>
-              <a:t>leur</a:t>
-            </a:r>
-            <a:r>
-              <a:rPr lang="en-US" dirty="0" smtClean="0"/>
+              <a:rPr lang="en-US" dirty="0" err="1"/>
+              <a:t>tous</a:t>
+            </a:r>
+            <a:r>
+              <a:rPr lang="en-US" dirty="0"/>
+              <a:t> manger à </a:t>
+            </a:r>
+            <a:r>
+              <a:rPr lang="en-US" dirty="0" err="1"/>
+              <a:t>peu</a:t>
+            </a:r>
+            <a:r>
+              <a:rPr lang="en-US" dirty="0"/>
               <a:t> </a:t>
             </a:r>
             <a:r>
-              <a:rPr lang="en-US" dirty="0" err="1" smtClean="0"/>
-              <a:t>faut</a:t>
-            </a:r>
-            <a:r>
-              <a:rPr lang="en-US" dirty="0" smtClean="0"/>
+              <a:rPr lang="en-US" dirty="0" err="1"/>
+              <a:t>près</a:t>
+            </a:r>
+            <a:r>
+              <a:rPr lang="en-US" dirty="0"/>
               <a:t> </a:t>
             </a:r>
             <a:r>
-              <a:rPr lang="en-US" dirty="0" err="1" smtClean="0"/>
-              <a:t>deux</a:t>
-            </a:r>
-            <a:r>
-              <a:rPr lang="en-US" dirty="0" smtClean="0"/>
-              <a:t> </a:t>
-            </a:r>
-            <a:r>
-              <a:rPr lang="en-US" dirty="0" err="1" smtClean="0"/>
-              <a:t>fourchettes</a:t>
-            </a:r>
-            <a:endParaRPr lang="en-US" dirty="0" smtClean="0"/>
-          </a:p>
-          <a:p>
-            <a:pPr lvl="1"/>
-            <a:r>
-              <a:rPr lang="en-US" dirty="0" err="1" smtClean="0"/>
-              <a:t>Ils</a:t>
-            </a:r>
-            <a:r>
-              <a:rPr lang="en-US" dirty="0" smtClean="0"/>
-              <a:t> </a:t>
-            </a:r>
-            <a:r>
-              <a:rPr lang="en-US" dirty="0" err="1" smtClean="0"/>
-              <a:t>doivent</a:t>
-            </a:r>
-            <a:r>
-              <a:rPr lang="en-US" dirty="0" smtClean="0"/>
-              <a:t> </a:t>
-            </a:r>
-            <a:r>
-              <a:rPr lang="en-US" dirty="0" err="1" smtClean="0"/>
-              <a:t>tous</a:t>
-            </a:r>
-            <a:r>
-              <a:rPr lang="en-US" dirty="0" smtClean="0"/>
-              <a:t> manger à </a:t>
-            </a:r>
-            <a:r>
-              <a:rPr lang="en-US" dirty="0" err="1" smtClean="0"/>
-              <a:t>peu</a:t>
-            </a:r>
-            <a:r>
-              <a:rPr lang="en-US" dirty="0" smtClean="0"/>
-              <a:t> </a:t>
-            </a:r>
-            <a:r>
-              <a:rPr lang="en-US" dirty="0" err="1" smtClean="0"/>
-              <a:t>près</a:t>
-            </a:r>
-            <a:r>
-              <a:rPr lang="en-US" dirty="0" smtClean="0"/>
-              <a:t> </a:t>
-            </a:r>
-            <a:r>
-              <a:rPr lang="en-US" dirty="0" err="1" smtClean="0"/>
+              <a:rPr lang="en-US" dirty="0" err="1"/>
               <a:t>autant</a:t>
             </a:r>
-            <a:endParaRPr lang="en-US" dirty="0" smtClean="0"/>
+            <a:endParaRPr lang="en-US" dirty="0"/>
           </a:p>
           <a:p>
             <a:pPr lvl="1"/>
@@ -15736,83 +15683,83 @@
           <a:p>
             <a:pPr lvl="1"/>
             <a:r>
-              <a:rPr lang="en-US" dirty="0" err="1" smtClean="0"/>
+              <a:rPr lang="en-US" dirty="0" err="1"/>
               <a:t>Problème</a:t>
             </a:r>
             <a:r>
-              <a:rPr lang="en-US" dirty="0" smtClean="0"/>
+              <a:rPr lang="en-US" dirty="0"/>
               <a:t>: </a:t>
             </a:r>
             <a:r>
-              <a:rPr lang="en-US" dirty="0" err="1" smtClean="0"/>
+              <a:rPr lang="en-US" dirty="0" err="1"/>
               <a:t>si</a:t>
             </a:r>
             <a:r>
-              <a:rPr lang="en-US" dirty="0" smtClean="0"/>
+              <a:rPr lang="en-US" dirty="0"/>
               <a:t> </a:t>
             </a:r>
             <a:r>
-              <a:rPr lang="en-US" dirty="0" err="1" smtClean="0"/>
+              <a:rPr lang="en-US" dirty="0" err="1"/>
               <a:t>ils</a:t>
             </a:r>
             <a:r>
-              <a:rPr lang="en-US" dirty="0" smtClean="0"/>
+              <a:rPr lang="en-US" dirty="0"/>
               <a:t> </a:t>
             </a:r>
             <a:r>
-              <a:rPr lang="en-US" dirty="0" err="1" smtClean="0"/>
+              <a:rPr lang="en-US" dirty="0" err="1"/>
               <a:t>prennent</a:t>
             </a:r>
             <a:r>
-              <a:rPr lang="en-US" dirty="0" smtClean="0"/>
+              <a:rPr lang="en-US" dirty="0"/>
               <a:t> </a:t>
             </a:r>
             <a:r>
-              <a:rPr lang="en-US" dirty="0" err="1" smtClean="0"/>
+              <a:rPr lang="en-US" dirty="0" err="1"/>
               <a:t>tous</a:t>
             </a:r>
             <a:r>
-              <a:rPr lang="en-US" dirty="0" smtClean="0"/>
+              <a:rPr lang="en-US" dirty="0"/>
               <a:t> la </a:t>
             </a:r>
             <a:r>
-              <a:rPr lang="en-US" dirty="0" err="1" smtClean="0"/>
+              <a:rPr lang="en-US" dirty="0" err="1"/>
               <a:t>fourchette</a:t>
             </a:r>
             <a:r>
-              <a:rPr lang="en-US" dirty="0" smtClean="0"/>
+              <a:rPr lang="en-US" dirty="0"/>
               <a:t> à </a:t>
             </a:r>
             <a:r>
-              <a:rPr lang="en-US" dirty="0" err="1" smtClean="0"/>
+              <a:rPr lang="en-US" dirty="0" err="1"/>
               <a:t>leur</a:t>
             </a:r>
             <a:r>
-              <a:rPr lang="en-US" dirty="0" smtClean="0"/>
+              <a:rPr lang="en-US" dirty="0"/>
               <a:t> </a:t>
             </a:r>
             <a:r>
-              <a:rPr lang="en-US" dirty="0" err="1" smtClean="0"/>
+              <a:rPr lang="en-US" dirty="0" err="1"/>
               <a:t>droite</a:t>
             </a:r>
             <a:r>
-              <a:rPr lang="en-US" dirty="0" smtClean="0"/>
+              <a:rPr lang="en-US" dirty="0"/>
               <a:t>, </a:t>
             </a:r>
             <a:r>
-              <a:rPr lang="en-US" dirty="0" err="1" smtClean="0"/>
+              <a:rPr lang="en-US" dirty="0" err="1"/>
               <a:t>aucun</a:t>
             </a:r>
             <a:r>
-              <a:rPr lang="en-US" dirty="0" smtClean="0"/>
+              <a:rPr lang="en-US" dirty="0"/>
               <a:t> ne </a:t>
             </a:r>
             <a:r>
-              <a:rPr lang="en-US" dirty="0" err="1" smtClean="0"/>
+              <a:rPr lang="en-US" dirty="0" err="1"/>
               <a:t>peut</a:t>
             </a:r>
             <a:r>
-              <a:rPr lang="en-US" dirty="0" smtClean="0"/>
+              <a:rPr lang="en-US" dirty="0"/>
               <a:t> manger</a:t>
             </a:r>
             <a:endParaRPr lang="fr-FR" dirty="0"/>
@@ -15895,7 +15842,7 @@
           <a:lstStyle/>
           <a:p>
             <a:r>
-              <a:rPr lang="fr-FR" smtClean="0"/>
+              <a:rPr lang="fr-FR"/>
               <a:t>07/04/2017</a:t>
             </a:r>
             <a:endParaRPr lang="en-US"/>
@@ -15918,7 +15865,7 @@
           <a:lstStyle/>
           <a:p>
             <a:r>
-              <a:rPr lang="en-US" smtClean="0"/>
+              <a:rPr lang="en-US"/>
               <a:t>Framework Amak</a:t>
             </a:r>
             <a:endParaRPr lang="en-US" dirty="0"/>
@@ -15970,13 +15917,6 @@
       </p:transition>
     </mc:Fallback>
   </mc:AlternateContent>
-  <p:timing>
-    <p:tnLst>
-      <p:par>
-        <p:cTn id="1" dur="indefinite" restart="never" nodeType="tmRoot"/>
-      </p:par>
-    </p:tnLst>
-  </p:timing>
 </p:sld>
 </file>
 
@@ -16013,15 +15953,15 @@
           <a:lstStyle/>
           <a:p>
             <a:r>
-              <a:rPr lang="en-US" dirty="0" err="1" smtClean="0"/>
+              <a:rPr lang="en-US" dirty="0" err="1"/>
               <a:t>Création</a:t>
             </a:r>
             <a:r>
-              <a:rPr lang="en-US" dirty="0" smtClean="0"/>
+              <a:rPr lang="en-US" dirty="0"/>
               <a:t> du </a:t>
             </a:r>
             <a:r>
-              <a:rPr lang="en-US" dirty="0" err="1" smtClean="0"/>
+              <a:rPr lang="en-US" dirty="0" err="1"/>
               <a:t>projet</a:t>
             </a:r>
             <a:endParaRPr lang="fr-FR" dirty="0"/>
@@ -16048,19 +15988,19 @@
               <a:buAutoNum type="arabicPeriod"/>
             </a:pPr>
             <a:r>
-              <a:rPr lang="en-US" dirty="0" err="1" smtClean="0"/>
+              <a:rPr lang="en-US" dirty="0" err="1"/>
               <a:t>Création</a:t>
             </a:r>
             <a:r>
-              <a:rPr lang="en-US" dirty="0" smtClean="0"/>
+              <a:rPr lang="en-US" dirty="0"/>
               <a:t> du </a:t>
             </a:r>
             <a:r>
-              <a:rPr lang="en-US" dirty="0" err="1" smtClean="0"/>
+              <a:rPr lang="en-US" dirty="0" err="1"/>
               <a:t>projet</a:t>
             </a:r>
             <a:r>
-              <a:rPr lang="en-US" dirty="0" smtClean="0"/>
+              <a:rPr lang="en-US" dirty="0"/>
               <a:t> Java</a:t>
             </a:r>
           </a:p>
@@ -16070,19 +16010,19 @@
               <a:buAutoNum type="arabicPeriod"/>
             </a:pPr>
             <a:r>
-              <a:rPr lang="en-US" dirty="0" err="1" smtClean="0"/>
+              <a:rPr lang="en-US" dirty="0" err="1"/>
               <a:t>Téléchargement</a:t>
             </a:r>
             <a:r>
-              <a:rPr lang="en-US" dirty="0" smtClean="0"/>
+              <a:rPr lang="en-US" dirty="0"/>
               <a:t> de la </a:t>
             </a:r>
             <a:r>
-              <a:rPr lang="en-US" dirty="0" err="1" smtClean="0"/>
+              <a:rPr lang="en-US" dirty="0" err="1"/>
               <a:t>librairie</a:t>
             </a:r>
             <a:r>
-              <a:rPr lang="en-US" dirty="0" smtClean="0"/>
+              <a:rPr lang="en-US" dirty="0"/>
               <a:t> (Amak-standalone.jar)</a:t>
             </a:r>
           </a:p>
@@ -16092,27 +16032,27 @@
               <a:buAutoNum type="arabicPeriod"/>
             </a:pPr>
             <a:r>
-              <a:rPr lang="en-US" dirty="0" err="1" smtClean="0"/>
+              <a:rPr lang="en-US" dirty="0" err="1"/>
               <a:t>Ajout</a:t>
             </a:r>
             <a:r>
-              <a:rPr lang="en-US" dirty="0" smtClean="0"/>
+              <a:rPr lang="en-US" dirty="0"/>
               <a:t> de la </a:t>
             </a:r>
             <a:r>
-              <a:rPr lang="en-US" dirty="0" err="1" smtClean="0"/>
+              <a:rPr lang="en-US" dirty="0" err="1"/>
               <a:t>librairie</a:t>
             </a:r>
             <a:r>
-              <a:rPr lang="en-US" dirty="0" smtClean="0"/>
+              <a:rPr lang="en-US" dirty="0"/>
               <a:t> au </a:t>
             </a:r>
             <a:r>
-              <a:rPr lang="en-US" dirty="0" err="1" smtClean="0"/>
+              <a:rPr lang="en-US" dirty="0" err="1"/>
               <a:t>projet</a:t>
             </a:r>
             <a:r>
-              <a:rPr lang="en-US" dirty="0" smtClean="0"/>
+              <a:rPr lang="en-US" dirty="0"/>
               <a:t> eclipse</a:t>
             </a:r>
           </a:p>
@@ -16122,19 +16062,19 @@
               <a:buAutoNum type="arabicPeriod"/>
             </a:pPr>
             <a:r>
-              <a:rPr lang="en-US" dirty="0" err="1" smtClean="0"/>
+              <a:rPr lang="en-US" dirty="0" err="1"/>
               <a:t>Clic</a:t>
             </a:r>
             <a:r>
-              <a:rPr lang="en-US" dirty="0" smtClean="0"/>
+              <a:rPr lang="en-US" dirty="0"/>
               <a:t> droit sur la </a:t>
             </a:r>
             <a:r>
-              <a:rPr lang="en-US" dirty="0" err="1" smtClean="0"/>
+              <a:rPr lang="en-US" dirty="0" err="1"/>
               <a:t>librairie</a:t>
             </a:r>
             <a:r>
-              <a:rPr lang="en-US" dirty="0" smtClean="0"/>
+              <a:rPr lang="en-US" dirty="0"/>
               <a:t>, build path -&gt; add to build path</a:t>
             </a:r>
             <a:endParaRPr lang="fr-FR" dirty="0"/>
@@ -16176,7 +16116,7 @@
           <a:lstStyle/>
           <a:p>
             <a:r>
-              <a:rPr lang="fr-FR" smtClean="0"/>
+              <a:rPr lang="fr-FR"/>
               <a:t>07/04/2017</a:t>
             </a:r>
             <a:endParaRPr lang="en-US"/>
@@ -16199,7 +16139,7 @@
           <a:lstStyle/>
           <a:p>
             <a:r>
-              <a:rPr lang="en-US" smtClean="0"/>
+              <a:rPr lang="en-US"/>
               <a:t>Framework Amak</a:t>
             </a:r>
             <a:endParaRPr lang="en-US" dirty="0"/>
@@ -16292,13 +16232,6 @@
       </p:transition>
     </mc:Fallback>
   </mc:AlternateContent>
-  <p:timing>
-    <p:tnLst>
-      <p:par>
-        <p:cTn id="1" dur="indefinite" restart="never" nodeType="tmRoot"/>
-      </p:par>
-    </p:tnLst>
-  </p:timing>
 </p:sld>
 </file>
 
@@ -16335,15 +16268,15 @@
           <a:lstStyle/>
           <a:p>
             <a:r>
-              <a:rPr lang="en-US" dirty="0" err="1" smtClean="0"/>
+              <a:rPr lang="en-US" dirty="0" err="1"/>
               <a:t>Création</a:t>
             </a:r>
             <a:r>
-              <a:rPr lang="en-US" dirty="0" smtClean="0"/>
+              <a:rPr lang="en-US" dirty="0"/>
               <a:t> de </a:t>
             </a:r>
             <a:r>
-              <a:rPr lang="en-US" dirty="0" err="1" smtClean="0"/>
+              <a:rPr lang="en-US" dirty="0" err="1"/>
               <a:t>l’environnement</a:t>
             </a:r>
             <a:endParaRPr lang="fr-FR" dirty="0"/>
@@ -16368,27 +16301,27 @@
           <a:lstStyle/>
           <a:p>
             <a:r>
-              <a:rPr lang="en-US" sz="3600" dirty="0" smtClean="0"/>
+              <a:rPr lang="en-US" sz="3600" dirty="0"/>
               <a:t>Table sur </a:t>
             </a:r>
             <a:r>
-              <a:rPr lang="en-US" sz="3600" dirty="0" err="1" smtClean="0"/>
+              <a:rPr lang="en-US" sz="3600" dirty="0" err="1"/>
               <a:t>laquelle</a:t>
             </a:r>
             <a:r>
-              <a:rPr lang="en-US" sz="3600" dirty="0" smtClean="0"/>
+              <a:rPr lang="en-US" sz="3600" dirty="0"/>
               <a:t> </a:t>
             </a:r>
             <a:r>
-              <a:rPr lang="en-US" sz="3600" dirty="0" err="1" smtClean="0"/>
+              <a:rPr lang="en-US" sz="3600" dirty="0" err="1"/>
               <a:t>il</a:t>
             </a:r>
             <a:r>
-              <a:rPr lang="en-US" sz="3600" dirty="0" smtClean="0"/>
+              <a:rPr lang="en-US" sz="3600" dirty="0"/>
               <a:t> y a des </a:t>
             </a:r>
             <a:r>
-              <a:rPr lang="en-US" sz="3600" dirty="0" err="1" smtClean="0"/>
+              <a:rPr lang="en-US" sz="3600" dirty="0" err="1"/>
               <a:t>fourchettes</a:t>
             </a:r>
             <a:endParaRPr lang="fr-FR" sz="3600" dirty="0"/>
@@ -16637,7 +16570,7 @@
           <a:lstStyle/>
           <a:p>
             <a:r>
-              <a:rPr lang="fr-FR" smtClean="0"/>
+              <a:rPr lang="fr-FR"/>
               <a:t>07/04/2017</a:t>
             </a:r>
             <a:endParaRPr lang="en-US"/>
@@ -16660,7 +16593,7 @@
           <a:lstStyle/>
           <a:p>
             <a:r>
-              <a:rPr lang="en-US" smtClean="0"/>
+              <a:rPr lang="en-US"/>
               <a:t>Framework Amak</a:t>
             </a:r>
             <a:endParaRPr lang="en-US" dirty="0"/>
@@ -16753,13 +16686,6 @@
       </p:transition>
     </mc:Fallback>
   </mc:AlternateContent>
-  <p:timing>
-    <p:tnLst>
-      <p:par>
-        <p:cTn id="1" dur="indefinite" restart="never" nodeType="tmRoot"/>
-      </p:par>
-    </p:tnLst>
-  </p:timing>
 </p:sld>
 </file>
 
@@ -16796,23 +16722,23 @@
           <a:lstStyle/>
           <a:p>
             <a:r>
-              <a:rPr lang="en-US" dirty="0" err="1" smtClean="0"/>
+              <a:rPr lang="en-US" dirty="0" err="1"/>
               <a:t>Création</a:t>
             </a:r>
             <a:r>
-              <a:rPr lang="en-US" dirty="0" smtClean="0"/>
+              <a:rPr lang="en-US" dirty="0"/>
               <a:t> de la </a:t>
             </a:r>
             <a:r>
-              <a:rPr lang="en-US" dirty="0" err="1" smtClean="0"/>
+              <a:rPr lang="en-US" dirty="0" err="1"/>
               <a:t>classe</a:t>
             </a:r>
             <a:r>
-              <a:rPr lang="en-US" dirty="0" smtClean="0"/>
+              <a:rPr lang="en-US" dirty="0"/>
               <a:t> </a:t>
             </a:r>
             <a:r>
-              <a:rPr lang="en-US" dirty="0" err="1" smtClean="0"/>
+              <a:rPr lang="en-US" dirty="0" err="1"/>
               <a:t>fourchette</a:t>
             </a:r>
             <a:endParaRPr lang="fr-FR" dirty="0"/>
@@ -16842,59 +16768,59 @@
           <a:lstStyle/>
           <a:p>
             <a:r>
-              <a:rPr lang="en-US" dirty="0" err="1" smtClean="0"/>
+              <a:rPr lang="en-US" dirty="0" err="1"/>
               <a:t>Une</a:t>
             </a:r>
             <a:r>
-              <a:rPr lang="en-US" dirty="0" smtClean="0"/>
+              <a:rPr lang="en-US" dirty="0"/>
               <a:t> </a:t>
             </a:r>
             <a:r>
-              <a:rPr lang="en-US" dirty="0" err="1" smtClean="0"/>
+              <a:rPr lang="en-US" dirty="0" err="1"/>
               <a:t>fourchette</a:t>
             </a:r>
             <a:r>
-              <a:rPr lang="en-US" dirty="0" smtClean="0"/>
+              <a:rPr lang="en-US" dirty="0"/>
               <a:t> </a:t>
             </a:r>
             <a:r>
-              <a:rPr lang="en-US" dirty="0" err="1" smtClean="0"/>
+              <a:rPr lang="en-US" dirty="0" err="1"/>
               <a:t>peut</a:t>
             </a:r>
             <a:r>
-              <a:rPr lang="en-US" dirty="0" smtClean="0"/>
+              <a:rPr lang="en-US" dirty="0"/>
               <a:t> </a:t>
             </a:r>
             <a:r>
-              <a:rPr lang="en-US" dirty="0" err="1" smtClean="0"/>
+              <a:rPr lang="en-US" dirty="0" err="1"/>
               <a:t>être</a:t>
             </a:r>
             <a:r>
-              <a:rPr lang="en-US" dirty="0" smtClean="0"/>
+              <a:rPr lang="en-US" dirty="0"/>
               <a:t> </a:t>
             </a:r>
             <a:r>
-              <a:rPr lang="en-US" dirty="0" err="1" smtClean="0"/>
+              <a:rPr lang="en-US" dirty="0" err="1"/>
               <a:t>prise</a:t>
             </a:r>
             <a:r>
-              <a:rPr lang="en-US" dirty="0" smtClean="0"/>
+              <a:rPr lang="en-US" dirty="0"/>
               <a:t> </a:t>
             </a:r>
             <a:r>
-              <a:rPr lang="en-US" dirty="0" err="1" smtClean="0"/>
+              <a:rPr lang="en-US" dirty="0" err="1"/>
               <a:t>ou</a:t>
             </a:r>
             <a:r>
-              <a:rPr lang="en-US" dirty="0" smtClean="0"/>
+              <a:rPr lang="en-US" dirty="0"/>
               <a:t> </a:t>
             </a:r>
             <a:r>
-              <a:rPr lang="en-US" dirty="0" err="1" smtClean="0"/>
+              <a:rPr lang="en-US" dirty="0" err="1"/>
               <a:t>relachée</a:t>
             </a:r>
             <a:r>
-              <a:rPr lang="en-US" dirty="0" smtClean="0"/>
+              <a:rPr lang="en-US" dirty="0"/>
               <a:t> par un philosophe</a:t>
             </a:r>
             <a:endParaRPr lang="fr-FR" dirty="0"/>
@@ -17131,19 +17057,19 @@
               <a:buNone/>
             </a:pPr>
             <a:r>
-              <a:rPr lang="fr-FR" sz="1600" b="1" dirty="0" err="1" smtClean="0"/>
+              <a:rPr lang="fr-FR" sz="1600" b="1" dirty="0" err="1"/>
               <a:t>private</a:t>
             </a:r>
             <a:r>
-              <a:rPr lang="fr-FR" sz="1600" b="1" dirty="0" smtClean="0"/>
+              <a:rPr lang="fr-FR" sz="1600" b="1" dirty="0"/>
               <a:t> Philosopher </a:t>
             </a:r>
             <a:r>
-              <a:rPr lang="fr-FR" sz="1600" b="1" dirty="0" err="1" smtClean="0"/>
+              <a:rPr lang="fr-FR" sz="1600" b="1" dirty="0" err="1"/>
               <a:t>takenBy</a:t>
             </a:r>
             <a:r>
-              <a:rPr lang="fr-FR" sz="1600" b="1" dirty="0" smtClean="0"/>
+              <a:rPr lang="fr-FR" sz="1600" b="1" dirty="0"/>
               <a:t>;</a:t>
             </a:r>
           </a:p>
@@ -17156,39 +17082,39 @@
               <a:buNone/>
             </a:pPr>
             <a:r>
-              <a:rPr lang="fr-FR" sz="1600" b="1" dirty="0" smtClean="0"/>
+              <a:rPr lang="fr-FR" sz="1600" b="1" dirty="0"/>
               <a:t>public </a:t>
             </a:r>
             <a:r>
-              <a:rPr lang="fr-FR" sz="1600" b="1" dirty="0" err="1" smtClean="0"/>
+              <a:rPr lang="fr-FR" sz="1600" b="1" dirty="0" err="1"/>
               <a:t>synchronized</a:t>
             </a:r>
             <a:r>
-              <a:rPr lang="fr-FR" sz="1600" b="1" dirty="0" smtClean="0"/>
+              <a:rPr lang="fr-FR" sz="1600" b="1" dirty="0"/>
               <a:t> </a:t>
             </a:r>
             <a:r>
-              <a:rPr lang="fr-FR" sz="1600" b="1" dirty="0" err="1" smtClean="0"/>
+              <a:rPr lang="fr-FR" sz="1600" b="1" dirty="0" err="1"/>
               <a:t>boolean</a:t>
             </a:r>
             <a:r>
-              <a:rPr lang="fr-FR" sz="1600" b="1" dirty="0" smtClean="0"/>
+              <a:rPr lang="fr-FR" sz="1600" b="1" dirty="0"/>
               <a:t> </a:t>
             </a:r>
             <a:r>
-              <a:rPr lang="fr-FR" sz="1600" b="1" dirty="0" err="1" smtClean="0"/>
+              <a:rPr lang="fr-FR" sz="1600" b="1" dirty="0" err="1"/>
               <a:t>tryTake</a:t>
             </a:r>
             <a:r>
-              <a:rPr lang="fr-FR" sz="1600" b="1" dirty="0" smtClean="0"/>
+              <a:rPr lang="fr-FR" sz="1600" b="1" dirty="0"/>
               <a:t>(Philosopher </a:t>
             </a:r>
             <a:r>
-              <a:rPr lang="fr-FR" sz="1600" b="1" dirty="0" err="1" smtClean="0"/>
+              <a:rPr lang="fr-FR" sz="1600" b="1" dirty="0" err="1"/>
               <a:t>asker</a:t>
             </a:r>
             <a:r>
-              <a:rPr lang="fr-FR" sz="1600" b="1" dirty="0" smtClean="0"/>
+              <a:rPr lang="fr-FR" sz="1600" b="1" dirty="0"/>
               <a:t>) {</a:t>
             </a:r>
           </a:p>
@@ -17201,23 +17127,23 @@
               <a:buNone/>
             </a:pPr>
             <a:r>
-              <a:rPr lang="fr-FR" sz="1600" b="1" dirty="0" smtClean="0"/>
+              <a:rPr lang="fr-FR" sz="1600" b="1" dirty="0"/>
               <a:t>        if (</a:t>
             </a:r>
             <a:r>
-              <a:rPr lang="fr-FR" sz="1600" b="1" dirty="0" err="1" smtClean="0"/>
+              <a:rPr lang="fr-FR" sz="1600" b="1" dirty="0" err="1"/>
               <a:t>takenBy</a:t>
             </a:r>
             <a:r>
-              <a:rPr lang="fr-FR" sz="1600" b="1" dirty="0" smtClean="0"/>
+              <a:rPr lang="fr-FR" sz="1600" b="1" dirty="0"/>
               <a:t> != </a:t>
             </a:r>
             <a:r>
-              <a:rPr lang="fr-FR" sz="1600" b="1" dirty="0" err="1" smtClean="0"/>
+              <a:rPr lang="fr-FR" sz="1600" b="1" dirty="0" err="1"/>
               <a:t>null</a:t>
             </a:r>
             <a:r>
-              <a:rPr lang="fr-FR" sz="1600" b="1" dirty="0" smtClean="0"/>
+              <a:rPr lang="fr-FR" sz="1600" b="1" dirty="0"/>
               <a:t>)</a:t>
             </a:r>
           </a:p>
@@ -17230,7 +17156,7 @@
               <a:buNone/>
             </a:pPr>
             <a:r>
-              <a:rPr lang="fr-FR" sz="1600" b="1" dirty="0" smtClean="0"/>
+              <a:rPr lang="fr-FR" sz="1600" b="1" dirty="0"/>
               <a:t>            return false;</a:t>
             </a:r>
           </a:p>
@@ -17243,23 +17169,23 @@
               <a:buNone/>
             </a:pPr>
             <a:r>
-              <a:rPr lang="fr-FR" sz="1600" b="1" dirty="0" smtClean="0"/>
+              <a:rPr lang="fr-FR" sz="1600" b="1" dirty="0"/>
               <a:t>        </a:t>
             </a:r>
             <a:r>
-              <a:rPr lang="fr-FR" sz="1600" b="1" dirty="0" err="1" smtClean="0"/>
+              <a:rPr lang="fr-FR" sz="1600" b="1" dirty="0" err="1"/>
               <a:t>takenBy</a:t>
             </a:r>
             <a:r>
-              <a:rPr lang="fr-FR" sz="1600" b="1" dirty="0" smtClean="0"/>
+              <a:rPr lang="fr-FR" sz="1600" b="1" dirty="0"/>
               <a:t> = </a:t>
             </a:r>
             <a:r>
-              <a:rPr lang="fr-FR" sz="1600" b="1" dirty="0" err="1" smtClean="0"/>
+              <a:rPr lang="fr-FR" sz="1600" b="1" dirty="0" err="1"/>
               <a:t>asker</a:t>
             </a:r>
             <a:r>
-              <a:rPr lang="fr-FR" sz="1600" b="1" dirty="0" smtClean="0"/>
+              <a:rPr lang="fr-FR" sz="1600" b="1" dirty="0"/>
               <a:t>;</a:t>
             </a:r>
           </a:p>
@@ -17272,15 +17198,15 @@
               <a:buNone/>
             </a:pPr>
             <a:r>
-              <a:rPr lang="fr-FR" sz="1600" b="1" dirty="0" smtClean="0"/>
+              <a:rPr lang="fr-FR" sz="1600" b="1" dirty="0"/>
               <a:t>        return </a:t>
             </a:r>
             <a:r>
-              <a:rPr lang="fr-FR" sz="1600" b="1" dirty="0" err="1" smtClean="0"/>
+              <a:rPr lang="fr-FR" sz="1600" b="1" dirty="0" err="1"/>
               <a:t>true</a:t>
             </a:r>
             <a:r>
-              <a:rPr lang="fr-FR" sz="1600" b="1" dirty="0" smtClean="0"/>
+              <a:rPr lang="fr-FR" sz="1600" b="1" dirty="0"/>
               <a:t>;</a:t>
             </a:r>
           </a:p>
@@ -17293,7 +17219,7 @@
               <a:buNone/>
             </a:pPr>
             <a:r>
-              <a:rPr lang="fr-FR" sz="1600" b="1" dirty="0" smtClean="0"/>
+              <a:rPr lang="fr-FR" sz="1600" b="1" dirty="0"/>
               <a:t>    }</a:t>
             </a:r>
           </a:p>
@@ -17306,31 +17232,31 @@
               <a:buNone/>
             </a:pPr>
             <a:r>
-              <a:rPr lang="fr-FR" sz="1600" b="1" dirty="0" smtClean="0"/>
+              <a:rPr lang="fr-FR" sz="1600" b="1" dirty="0"/>
               <a:t>    public </a:t>
             </a:r>
             <a:r>
-              <a:rPr lang="fr-FR" sz="1600" b="1" dirty="0" err="1" smtClean="0"/>
+              <a:rPr lang="fr-FR" sz="1600" b="1" dirty="0" err="1"/>
               <a:t>synchronized</a:t>
             </a:r>
             <a:r>
-              <a:rPr lang="fr-FR" sz="1600" b="1" dirty="0" smtClean="0"/>
+              <a:rPr lang="fr-FR" sz="1600" b="1" dirty="0"/>
               <a:t> </a:t>
             </a:r>
             <a:r>
-              <a:rPr lang="fr-FR" sz="1600" b="1" dirty="0" err="1" smtClean="0"/>
+              <a:rPr lang="fr-FR" sz="1600" b="1" dirty="0" err="1"/>
               <a:t>void</a:t>
             </a:r>
             <a:r>
-              <a:rPr lang="fr-FR" sz="1600" b="1" dirty="0" smtClean="0"/>
+              <a:rPr lang="fr-FR" sz="1600" b="1" dirty="0"/>
               <a:t> release(Philosopher </a:t>
             </a:r>
             <a:r>
-              <a:rPr lang="fr-FR" sz="1600" b="1" dirty="0" err="1" smtClean="0"/>
+              <a:rPr lang="fr-FR" sz="1600" b="1" dirty="0" err="1"/>
               <a:t>asker</a:t>
             </a:r>
             <a:r>
-              <a:rPr lang="fr-FR" sz="1600" b="1" dirty="0" smtClean="0"/>
+              <a:rPr lang="fr-FR" sz="1600" b="1" dirty="0"/>
               <a:t>) {</a:t>
             </a:r>
           </a:p>
@@ -17343,23 +17269,23 @@
               <a:buNone/>
             </a:pPr>
             <a:r>
-              <a:rPr lang="fr-FR" sz="1600" b="1" dirty="0" smtClean="0"/>
+              <a:rPr lang="fr-FR" sz="1600" b="1" dirty="0"/>
               <a:t>        if (</a:t>
             </a:r>
             <a:r>
-              <a:rPr lang="fr-FR" sz="1600" b="1" dirty="0" err="1" smtClean="0"/>
+              <a:rPr lang="fr-FR" sz="1600" b="1" dirty="0" err="1"/>
               <a:t>takenBy</a:t>
             </a:r>
             <a:r>
-              <a:rPr lang="fr-FR" sz="1600" b="1" dirty="0" smtClean="0"/>
+              <a:rPr lang="fr-FR" sz="1600" b="1" dirty="0"/>
               <a:t> == </a:t>
             </a:r>
             <a:r>
-              <a:rPr lang="fr-FR" sz="1600" b="1" dirty="0" err="1" smtClean="0"/>
+              <a:rPr lang="fr-FR" sz="1600" b="1" dirty="0" err="1"/>
               <a:t>asker</a:t>
             </a:r>
             <a:r>
-              <a:rPr lang="fr-FR" sz="1600" b="1" dirty="0" smtClean="0"/>
+              <a:rPr lang="fr-FR" sz="1600" b="1" dirty="0"/>
               <a:t>) {</a:t>
             </a:r>
           </a:p>
@@ -17372,23 +17298,23 @@
               <a:buNone/>
             </a:pPr>
             <a:r>
-              <a:rPr lang="fr-FR" sz="1600" b="1" dirty="0" smtClean="0"/>
+              <a:rPr lang="fr-FR" sz="1600" b="1" dirty="0"/>
               <a:t>            </a:t>
             </a:r>
             <a:r>
-              <a:rPr lang="fr-FR" sz="1600" b="1" dirty="0" err="1" smtClean="0"/>
+              <a:rPr lang="fr-FR" sz="1600" b="1" dirty="0" err="1"/>
               <a:t>takenBy</a:t>
             </a:r>
             <a:r>
-              <a:rPr lang="fr-FR" sz="1600" b="1" dirty="0" smtClean="0"/>
+              <a:rPr lang="fr-FR" sz="1600" b="1" dirty="0"/>
               <a:t> = </a:t>
             </a:r>
             <a:r>
-              <a:rPr lang="fr-FR" sz="1600" b="1" dirty="0" err="1" smtClean="0"/>
+              <a:rPr lang="fr-FR" sz="1600" b="1" dirty="0" err="1"/>
               <a:t>null</a:t>
             </a:r>
             <a:r>
-              <a:rPr lang="fr-FR" sz="1600" b="1" dirty="0" smtClean="0"/>
+              <a:rPr lang="fr-FR" sz="1600" b="1" dirty="0"/>
               <a:t>;</a:t>
             </a:r>
           </a:p>
@@ -17401,7 +17327,7 @@
               <a:buNone/>
             </a:pPr>
             <a:r>
-              <a:rPr lang="fr-FR" sz="1600" b="1" dirty="0" smtClean="0"/>
+              <a:rPr lang="fr-FR" sz="1600" b="1" dirty="0"/>
               <a:t>        }</a:t>
             </a:r>
           </a:p>
@@ -17414,7 +17340,7 @@
               <a:buNone/>
             </a:pPr>
             <a:r>
-              <a:rPr lang="fr-FR" sz="1600" b="1" dirty="0" smtClean="0"/>
+              <a:rPr lang="fr-FR" sz="1600" b="1" dirty="0"/>
               <a:t>    }</a:t>
             </a:r>
           </a:p>
@@ -17436,7 +17362,7 @@
           <a:lstStyle/>
           <a:p>
             <a:r>
-              <a:rPr lang="fr-FR" smtClean="0"/>
+              <a:rPr lang="fr-FR"/>
               <a:t>07/04/2017</a:t>
             </a:r>
             <a:endParaRPr lang="en-US"/>
@@ -17459,7 +17385,7 @@
           <a:lstStyle/>
           <a:p>
             <a:r>
-              <a:rPr lang="en-US" smtClean="0"/>
+              <a:rPr lang="en-US"/>
               <a:t>Framework Amak</a:t>
             </a:r>
             <a:endParaRPr lang="en-US" dirty="0"/>
@@ -17552,13 +17478,6 @@
       </p:transition>
     </mc:Fallback>
   </mc:AlternateContent>
-  <p:timing>
-    <p:tnLst>
-      <p:par>
-        <p:cTn id="1" dur="indefinite" restart="never" nodeType="tmRoot"/>
-      </p:par>
-    </p:tnLst>
-  </p:timing>
 </p:sld>
 </file>
 
@@ -17595,11 +17514,11 @@
           <a:lstStyle/>
           <a:p>
             <a:r>
-              <a:rPr lang="en-US" dirty="0" err="1" smtClean="0"/>
+              <a:rPr lang="en-US" dirty="0" err="1"/>
               <a:t>Création</a:t>
             </a:r>
             <a:r>
-              <a:rPr lang="en-US" dirty="0" smtClean="0"/>
+              <a:rPr lang="en-US" dirty="0"/>
               <a:t> du SMA</a:t>
             </a:r>
             <a:endParaRPr lang="fr-FR" dirty="0"/>
@@ -17624,11 +17543,11 @@
           <a:lstStyle/>
           <a:p>
             <a:r>
-              <a:rPr lang="en-US" dirty="0" err="1" smtClean="0"/>
+              <a:rPr lang="en-US" dirty="0" err="1"/>
               <a:t>Méthode</a:t>
             </a:r>
             <a:r>
-              <a:rPr lang="en-US" dirty="0" smtClean="0"/>
+              <a:rPr lang="en-US" dirty="0"/>
               <a:t> de creation des agents</a:t>
             </a:r>
             <a:endParaRPr lang="fr-FR" dirty="0"/>
@@ -17664,7 +17583,7 @@
               <a:buNone/>
             </a:pPr>
             <a:r>
-              <a:rPr lang="fr-FR" sz="900" b="1" dirty="0" smtClean="0"/>
+              <a:rPr lang="fr-FR" sz="900" b="1" dirty="0"/>
               <a:t>@</a:t>
             </a:r>
             <a:r>
@@ -17919,15 +17838,7 @@
             </a:r>
             <a:r>
               <a:rPr lang="fr-FR" sz="900" b="1" dirty="0"/>
-              <a:t>().length-1</a:t>
-            </a:r>
-            <a:r>
-              <a:rPr lang="fr-FR" sz="900" b="1" dirty="0" smtClean="0"/>
-              <a:t>] = new </a:t>
-            </a:r>
-            <a:r>
-              <a:rPr lang="fr-FR" sz="900" b="1" dirty="0"/>
-              <a:t>Philosopher(</a:t>
+              <a:t>().length-1] = new Philosopher(</a:t>
             </a:r>
             <a:r>
               <a:rPr lang="fr-FR" sz="900" b="1" dirty="0" err="1"/>
@@ -17946,11 +17857,11 @@
               <a:t>().length-1, </a:t>
             </a:r>
             <a:r>
-              <a:rPr lang="fr-FR" sz="900" b="1" dirty="0" err="1" smtClean="0"/>
+              <a:rPr lang="fr-FR" sz="900" b="1" dirty="0" err="1"/>
               <a:t>this</a:t>
             </a:r>
             <a:r>
-              <a:rPr lang="fr-FR" sz="900" b="1" dirty="0" smtClean="0"/>
+              <a:rPr lang="fr-FR" sz="900" b="1" dirty="0"/>
               <a:t>,</a:t>
             </a:r>
           </a:p>
@@ -17962,7 +17873,7 @@
               <a:buNone/>
             </a:pPr>
             <a:r>
-              <a:rPr lang="fr-FR" sz="900" b="1" dirty="0" err="1" smtClean="0"/>
+              <a:rPr lang="fr-FR" sz="900" b="1" dirty="0" err="1"/>
               <a:t>getEnvironment</a:t>
             </a:r>
             <a:r>
@@ -18194,7 +18105,7 @@
           <a:lstStyle/>
           <a:p>
             <a:r>
-              <a:rPr lang="fr-FR" smtClean="0"/>
+              <a:rPr lang="fr-FR"/>
               <a:t>07/04/2017</a:t>
             </a:r>
             <a:endParaRPr lang="en-US"/>
@@ -18217,7 +18128,7 @@
           <a:lstStyle/>
           <a:p>
             <a:r>
-              <a:rPr lang="en-US" smtClean="0"/>
+              <a:rPr lang="en-US"/>
               <a:t>Framework Amak</a:t>
             </a:r>
             <a:endParaRPr lang="en-US" dirty="0"/>
@@ -18310,13 +18221,6 @@
       </p:transition>
     </mc:Fallback>
   </mc:AlternateContent>
-  <p:timing>
-    <p:tnLst>
-      <p:par>
-        <p:cTn id="1" dur="indefinite" restart="never" nodeType="tmRoot"/>
-      </p:par>
-    </p:tnLst>
-  </p:timing>
 </p:sld>
 </file>
 
@@ -18353,19 +18257,19 @@
           <a:lstStyle/>
           <a:p>
             <a:r>
-              <a:rPr lang="en-US" dirty="0" err="1" smtClean="0"/>
+              <a:rPr lang="en-US" dirty="0" err="1"/>
               <a:t>Création</a:t>
             </a:r>
             <a:r>
-              <a:rPr lang="en-US" dirty="0" smtClean="0"/>
+              <a:rPr lang="en-US" dirty="0"/>
               <a:t> de </a:t>
             </a:r>
             <a:r>
-              <a:rPr lang="en-US" dirty="0" err="1" smtClean="0"/>
+              <a:rPr lang="en-US" dirty="0" err="1"/>
               <a:t>l’agent</a:t>
             </a:r>
             <a:r>
-              <a:rPr lang="en-US" dirty="0" smtClean="0"/>
+              <a:rPr lang="en-US" dirty="0"/>
               <a:t> philosophe</a:t>
             </a:r>
             <a:endParaRPr lang="fr-FR" dirty="0"/>
@@ -18395,49 +18299,49 @@
           <a:lstStyle/>
           <a:p>
             <a:r>
-              <a:rPr lang="en-US" sz="2400" dirty="0" err="1" smtClean="0"/>
+              <a:rPr lang="en-US" sz="2400" dirty="0" err="1"/>
               <a:t>Comportement</a:t>
             </a:r>
             <a:r>
-              <a:rPr lang="en-US" sz="2400" dirty="0" smtClean="0"/>
+              <a:rPr lang="en-US" sz="2400" dirty="0"/>
               <a:t> de </a:t>
             </a:r>
             <a:r>
-              <a:rPr lang="en-US" sz="2400" dirty="0" err="1" smtClean="0"/>
+              <a:rPr lang="en-US" sz="2400" dirty="0" err="1"/>
               <a:t>l’agent</a:t>
             </a:r>
-            <a:endParaRPr lang="en-US" sz="2400" dirty="0" smtClean="0"/>
-          </a:p>
-          <a:p>
-            <a:r>
-              <a:rPr lang="en-US" sz="2400" dirty="0" err="1" smtClean="0"/>
+            <a:endParaRPr lang="en-US" sz="2400" dirty="0"/>
+          </a:p>
+          <a:p>
+            <a:r>
+              <a:rPr lang="en-US" sz="2400" dirty="0" err="1"/>
               <a:t>Calcul</a:t>
             </a:r>
             <a:r>
-              <a:rPr lang="en-US" sz="2400" dirty="0" smtClean="0"/>
+              <a:rPr lang="en-US" sz="2400" dirty="0"/>
               <a:t> de la </a:t>
             </a:r>
             <a:r>
-              <a:rPr lang="en-US" sz="2400" dirty="0" err="1" smtClean="0"/>
+              <a:rPr lang="en-US" sz="2400" dirty="0" err="1"/>
               <a:t>criticité</a:t>
             </a:r>
-            <a:endParaRPr lang="en-US" sz="2400" dirty="0" smtClean="0"/>
-          </a:p>
-          <a:p>
-            <a:r>
-              <a:rPr lang="en-US" sz="2400" dirty="0" err="1" smtClean="0"/>
+            <a:endParaRPr lang="en-US" sz="2400" dirty="0"/>
+          </a:p>
+          <a:p>
+            <a:r>
+              <a:rPr lang="en-US" sz="2400" dirty="0" err="1"/>
               <a:t>Affichage</a:t>
             </a:r>
             <a:r>
-              <a:rPr lang="en-US" sz="2400" dirty="0" smtClean="0"/>
+              <a:rPr lang="en-US" sz="2400" dirty="0"/>
               <a:t> </a:t>
             </a:r>
             <a:r>
-              <a:rPr lang="en-US" sz="2400" dirty="0" err="1" smtClean="0"/>
+              <a:rPr lang="en-US" sz="2400" dirty="0" err="1"/>
               <a:t>d’une</a:t>
             </a:r>
             <a:r>
-              <a:rPr lang="en-US" sz="2400" dirty="0" smtClean="0"/>
+              <a:rPr lang="en-US" sz="2400" dirty="0"/>
               <a:t> information</a:t>
             </a:r>
             <a:endParaRPr lang="fr-FR" sz="2400" dirty="0"/>
@@ -18476,16 +18380,12 @@
               <a:buNone/>
             </a:pPr>
             <a:r>
-              <a:rPr lang="fr-FR" b="1" dirty="0" err="1" smtClean="0"/>
+              <a:rPr lang="fr-FR" b="1" dirty="0" err="1"/>
               <a:t>protected</a:t>
             </a:r>
             <a:r>
-              <a:rPr lang="fr-FR" b="1" dirty="0" smtClean="0"/>
-              <a:t> </a:t>
-            </a:r>
-            <a:r>
               <a:rPr lang="fr-FR" b="1" dirty="0"/>
-              <a:t>double </a:t>
+              <a:t> double </a:t>
             </a:r>
             <a:r>
               <a:rPr lang="fr-FR" b="1" dirty="0" err="1"/>
@@ -18493,11 +18393,7 @@
             </a:r>
             <a:r>
               <a:rPr lang="fr-FR" b="1" dirty="0"/>
-              <a:t>() </a:t>
-            </a:r>
-            <a:r>
-              <a:rPr lang="fr-FR" b="1" dirty="0" smtClean="0"/>
-              <a:t>{</a:t>
+              <a:t>() {</a:t>
             </a:r>
           </a:p>
           <a:p>
@@ -18506,11 +18402,7 @@
             </a:pPr>
             <a:r>
               <a:rPr lang="en-US" b="1" dirty="0"/>
-              <a:t> </a:t>
-            </a:r>
-            <a:r>
-              <a:rPr lang="en-US" b="1" dirty="0" smtClean="0"/>
-              <a:t>  	return hunger;</a:t>
+              <a:t>   	return hunger;</a:t>
             </a:r>
           </a:p>
           <a:p>
@@ -18518,7 +18410,7 @@
               <a:buNone/>
             </a:pPr>
             <a:r>
-              <a:rPr lang="en-US" b="1" dirty="0" smtClean="0"/>
+              <a:rPr lang="en-US" b="1" dirty="0"/>
               <a:t>}</a:t>
             </a:r>
           </a:p>
@@ -18527,11 +18419,11 @@
               <a:buNone/>
             </a:pPr>
             <a:r>
-              <a:rPr lang="fr-FR" b="1" dirty="0" err="1" smtClean="0"/>
+              <a:rPr lang="fr-FR" b="1" dirty="0" err="1"/>
               <a:t>protected</a:t>
             </a:r>
             <a:r>
-              <a:rPr lang="fr-FR" b="1" dirty="0" smtClean="0"/>
+              <a:rPr lang="fr-FR" b="1" dirty="0"/>
               <a:t> </a:t>
             </a:r>
             <a:r>
@@ -18548,11 +18440,7 @@
             </a:r>
             <a:r>
               <a:rPr lang="fr-FR" b="1" dirty="0"/>
-              <a:t>() </a:t>
-            </a:r>
-            <a:r>
-              <a:rPr lang="fr-FR" b="1" dirty="0" smtClean="0"/>
-              <a:t>{</a:t>
+              <a:t>() {</a:t>
             </a:r>
           </a:p>
           <a:p>
@@ -18560,7 +18448,7 @@
               <a:buNone/>
             </a:pPr>
             <a:r>
-              <a:rPr lang="en-US" b="1" dirty="0" smtClean="0"/>
+              <a:rPr lang="en-US" b="1" dirty="0"/>
               <a:t>…</a:t>
             </a:r>
           </a:p>
@@ -18569,7 +18457,7 @@
               <a:buNone/>
             </a:pPr>
             <a:r>
-              <a:rPr lang="en-US" b="1" dirty="0" smtClean="0"/>
+              <a:rPr lang="en-US" b="1" dirty="0"/>
               <a:t>}</a:t>
             </a:r>
           </a:p>
@@ -18599,7 +18487,7 @@
             </a:r>
             <a:r>
               <a:rPr lang="fr-FR" b="1" dirty="0" err="1"/>
-              <a:t>onDraw</a:t>
+              <a:t>onUpdateRender</a:t>
             </a:r>
             <a:r>
               <a:rPr lang="fr-FR" b="1" dirty="0"/>
@@ -18690,7 +18578,7 @@
           <a:lstStyle/>
           <a:p>
             <a:r>
-              <a:rPr lang="fr-FR" smtClean="0"/>
+              <a:rPr lang="fr-FR"/>
               <a:t>07/04/2017</a:t>
             </a:r>
             <a:endParaRPr lang="en-US"/>
@@ -18713,7 +18601,7 @@
           <a:lstStyle/>
           <a:p>
             <a:r>
-              <a:rPr lang="en-US" smtClean="0"/>
+              <a:rPr lang="en-US"/>
               <a:t>Framework Amak</a:t>
             </a:r>
             <a:endParaRPr lang="en-US" dirty="0"/>
@@ -18765,13 +18653,6 @@
       </p:transition>
     </mc:Fallback>
   </mc:AlternateContent>
-  <p:timing>
-    <p:tnLst>
-      <p:par>
-        <p:cTn id="1" dur="indefinite" restart="never" nodeType="tmRoot"/>
-      </p:par>
-    </p:tnLst>
-  </p:timing>
 </p:sld>
 </file>
 
@@ -18808,7 +18689,7 @@
           <a:lstStyle/>
           <a:p>
             <a:r>
-              <a:rPr lang="en-US" dirty="0" err="1" smtClean="0"/>
+              <a:rPr lang="en-US" dirty="0" err="1"/>
               <a:t>Lancement</a:t>
             </a:r>
             <a:endParaRPr lang="fr-FR" dirty="0"/>
@@ -18868,7 +18749,7 @@
               <a:buNone/>
             </a:pPr>
             <a:r>
-              <a:rPr lang="fr-FR" dirty="0" smtClean="0"/>
+              <a:rPr lang="fr-FR" dirty="0"/>
               <a:t>new </a:t>
             </a:r>
             <a:r>
@@ -18906,7 +18787,7 @@
           <a:lstStyle/>
           <a:p>
             <a:r>
-              <a:rPr lang="fr-FR" smtClean="0"/>
+              <a:rPr lang="fr-FR"/>
               <a:t>07/04/2017</a:t>
             </a:r>
             <a:endParaRPr lang="en-US"/>
@@ -18929,7 +18810,7 @@
           <a:lstStyle/>
           <a:p>
             <a:r>
-              <a:rPr lang="en-US" smtClean="0"/>
+              <a:rPr lang="en-US"/>
               <a:t>Framework Amak</a:t>
             </a:r>
             <a:endParaRPr lang="en-US" dirty="0"/>
@@ -18981,13 +18862,6 @@
       </p:transition>
     </mc:Fallback>
   </mc:AlternateContent>
-  <p:timing>
-    <p:tnLst>
-      <p:par>
-        <p:cTn id="1" dur="indefinite" restart="never" nodeType="tmRoot"/>
-      </p:par>
-    </p:tnLst>
-  </p:timing>
 </p:sld>
 </file>
 
@@ -19024,12 +18898,8 @@
           <a:lstStyle/>
           <a:p>
             <a:r>
-              <a:rPr lang="en-US" dirty="0" smtClean="0"/>
-              <a:t>Liens et </a:t>
-            </a:r>
-            <a:r>
-              <a:rPr lang="en-US" dirty="0" err="1" smtClean="0"/>
-              <a:t>démos</a:t>
+              <a:rPr lang="en-US" dirty="0"/>
+              <a:t>Liens</a:t>
             </a:r>
             <a:endParaRPr lang="fr-FR" dirty="0"/>
           </a:p>
@@ -19056,56 +18926,44 @@
           <a:lstStyle/>
           <a:p>
             <a:r>
-              <a:rPr lang="en-US" dirty="0" err="1" smtClean="0"/>
+              <a:rPr lang="en-US" dirty="0" err="1"/>
               <a:t>Dépot</a:t>
             </a:r>
             <a:r>
-              <a:rPr lang="en-US" dirty="0" smtClean="0"/>
+              <a:rPr lang="en-US" dirty="0"/>
               <a:t> public</a:t>
             </a:r>
           </a:p>
           <a:p>
             <a:pPr lvl="1"/>
             <a:r>
-              <a:rPr lang="en-US" dirty="0" smtClean="0">
+              <a:rPr lang="en-US" dirty="0">
                 <a:hlinkClick r:id="rId2"/>
               </a:rPr>
               <a:t>https://bitbucket.org/perlesa/amak</a:t>
             </a:r>
-            <a:endParaRPr lang="en-US" dirty="0" smtClean="0"/>
+            <a:endParaRPr lang="en-US" dirty="0"/>
           </a:p>
           <a:p>
             <a:pPr lvl="1"/>
-            <a:endParaRPr lang="en-US" dirty="0" smtClean="0"/>
-          </a:p>
-          <a:p>
-            <a:r>
-              <a:rPr lang="en-US" dirty="0" err="1" smtClean="0"/>
-              <a:t>Exemples</a:t>
-            </a:r>
-            <a:endParaRPr lang="en-US" dirty="0" smtClean="0"/>
+            <a:endParaRPr lang="en-US" dirty="0"/>
+          </a:p>
+          <a:p>
+            <a:r>
+              <a:rPr lang="en-US" dirty="0" err="1"/>
+              <a:t>Exercices</a:t>
+            </a:r>
+            <a:endParaRPr lang="en-US" dirty="0"/>
           </a:p>
           <a:p>
             <a:pPr lvl="1"/>
-            <a:r>
-              <a:rPr lang="en-US" dirty="0" smtClean="0">
-                <a:hlinkClick r:id="rId3"/>
-              </a:rPr>
-              <a:t>https</a:t>
-            </a:r>
             <a:r>
               <a:rPr lang="en-US" dirty="0">
                 <a:hlinkClick r:id="rId3"/>
               </a:rPr>
-              <a:t>://</a:t>
-            </a:r>
-            <a:r>
-              <a:rPr lang="en-US" dirty="0" smtClean="0">
-                <a:hlinkClick r:id="rId3"/>
-              </a:rPr>
-              <a:t>bitbucket.org/perlesa/amak-examples</a:t>
-            </a:r>
-            <a:endParaRPr lang="en-US" dirty="0" smtClean="0"/>
+              <a:t>https://bitbucket.org/perlesa/amas-exercises</a:t>
+            </a:r>
+            <a:endParaRPr lang="en-US" dirty="0"/>
           </a:p>
         </p:txBody>
       </p:sp>
@@ -19130,31 +18988,38 @@
           <a:lstStyle/>
           <a:p>
             <a:r>
-              <a:rPr lang="en-US" dirty="0" smtClean="0"/>
+              <a:rPr lang="en-US" dirty="0"/>
               <a:t>Contributions</a:t>
             </a:r>
           </a:p>
           <a:p>
             <a:r>
-              <a:rPr lang="en-US" dirty="0" smtClean="0"/>
+              <a:rPr lang="en-US" dirty="0"/>
               <a:t>Wiki</a:t>
             </a:r>
           </a:p>
           <a:p>
             <a:r>
-              <a:rPr lang="en-US" dirty="0" err="1" smtClean="0"/>
+              <a:rPr lang="en-US" dirty="0" err="1"/>
               <a:t>Exemples</a:t>
             </a:r>
-            <a:endParaRPr lang="en-US" dirty="0" smtClean="0"/>
-          </a:p>
-          <a:p>
-            <a:r>
-              <a:rPr lang="en-US" dirty="0" smtClean="0"/>
+            <a:endParaRPr lang="en-US" dirty="0"/>
+          </a:p>
+          <a:p>
+            <a:r>
+              <a:rPr lang="en-US" dirty="0"/>
               <a:t>Slack: #</a:t>
             </a:r>
             <a:r>
-              <a:rPr lang="en-US" dirty="0" err="1" smtClean="0"/>
+              <a:rPr lang="en-US" dirty="0" err="1"/>
               <a:t>Amak</a:t>
+            </a:r>
+            <a:endParaRPr lang="en-US" dirty="0"/>
+          </a:p>
+          <a:p>
+            <a:r>
+              <a:rPr lang="en-US" dirty="0"/>
+              <a:t>Mailing list</a:t>
             </a:r>
             <a:endParaRPr lang="fr-FR" dirty="0"/>
           </a:p>
@@ -19176,7 +19041,7 @@
           <a:lstStyle/>
           <a:p>
             <a:r>
-              <a:rPr lang="fr-FR" smtClean="0"/>
+              <a:rPr lang="fr-FR"/>
               <a:t>07/04/2017</a:t>
             </a:r>
             <a:endParaRPr lang="en-US"/>
@@ -19199,7 +19064,7 @@
           <a:lstStyle/>
           <a:p>
             <a:r>
-              <a:rPr lang="en-US" smtClean="0"/>
+              <a:rPr lang="en-US"/>
               <a:t>Framework Amak</a:t>
             </a:r>
             <a:endParaRPr lang="en-US" dirty="0"/>
@@ -19251,13 +19116,557 @@
       </p:transition>
     </mc:Fallback>
   </mc:AlternateContent>
-  <p:timing>
-    <p:tnLst>
-      <p:par>
-        <p:cTn id="1" dur="indefinite" restart="never" nodeType="tmRoot"/>
-      </p:par>
-    </p:tnLst>
-  </p:timing>
+</p:sld>
+</file>
+
+<file path=ppt/slides/slide19.xml><?xml version="1.0" encoding="utf-8"?>
+<p:sld xmlns:a="http://schemas.openxmlformats.org/drawingml/2006/main" xmlns:r="http://schemas.openxmlformats.org/officeDocument/2006/relationships" xmlns:p="http://schemas.openxmlformats.org/presentationml/2006/main">
+  <p:cSld>
+    <p:spTree>
+      <p:nvGrpSpPr>
+        <p:cNvPr id="1" name=""/>
+        <p:cNvGrpSpPr/>
+        <p:nvPr/>
+      </p:nvGrpSpPr>
+      <p:grpSpPr>
+        <a:xfrm>
+          <a:off x="0" y="0"/>
+          <a:ext cx="0" cy="0"/>
+          <a:chOff x="0" y="0"/>
+          <a:chExt cx="0" cy="0"/>
+        </a:xfrm>
+      </p:grpSpPr>
+      <p:sp>
+        <p:nvSpPr>
+          <p:cNvPr id="2" name="Titre 1">
+            <a:extLst>
+              <a:ext uri="{FF2B5EF4-FFF2-40B4-BE49-F238E27FC236}">
+                <a16:creationId xmlns:a16="http://schemas.microsoft.com/office/drawing/2014/main" id="{94710906-08E0-5645-8957-04A3146D76F5}"/>
+              </a:ext>
+            </a:extLst>
+          </p:cNvPr>
+          <p:cNvSpPr>
+            <a:spLocks noGrp="1"/>
+          </p:cNvSpPr>
+          <p:nvPr>
+            <p:ph type="title"/>
+          </p:nvPr>
+        </p:nvSpPr>
+        <p:spPr>
+          <a:xfrm>
+            <a:off x="1295400" y="503853"/>
+            <a:ext cx="9601200" cy="613747"/>
+          </a:xfrm>
+        </p:spPr>
+        <p:txBody>
+          <a:bodyPr/>
+          <a:lstStyle/>
+          <a:p>
+            <a:r>
+              <a:rPr lang="fr-FR" dirty="0"/>
+              <a:t>VUI</a:t>
+            </a:r>
+          </a:p>
+        </p:txBody>
+      </p:sp>
+      <p:sp>
+        <p:nvSpPr>
+          <p:cNvPr id="3" name="Espace réservé du contenu 2">
+            <a:extLst>
+              <a:ext uri="{FF2B5EF4-FFF2-40B4-BE49-F238E27FC236}">
+                <a16:creationId xmlns:a16="http://schemas.microsoft.com/office/drawing/2014/main" id="{05B5CBA7-E699-C14C-86AF-6AEEF2D5E97F}"/>
+              </a:ext>
+            </a:extLst>
+          </p:cNvPr>
+          <p:cNvSpPr>
+            <a:spLocks noGrp="1"/>
+          </p:cNvSpPr>
+          <p:nvPr>
+            <p:ph sz="half" idx="1"/>
+          </p:nvPr>
+        </p:nvSpPr>
+        <p:spPr>
+          <a:xfrm>
+            <a:off x="193040" y="1117601"/>
+            <a:ext cx="5862320" cy="4673600"/>
+          </a:xfrm>
+        </p:spPr>
+        <p:txBody>
+          <a:bodyPr>
+            <a:noAutofit/>
+          </a:bodyPr>
+          <a:lstStyle/>
+          <a:p>
+            <a:pPr marL="0" indent="0">
+              <a:lnSpc>
+                <a:spcPct val="100000"/>
+              </a:lnSpc>
+              <a:buNone/>
+            </a:pPr>
+            <a:r>
+              <a:rPr lang="fr-FR" sz="1400" dirty="0"/>
+              <a:t>public class </a:t>
+            </a:r>
+            <a:r>
+              <a:rPr lang="fr-FR" sz="1400" dirty="0" err="1"/>
+              <a:t>AntExample</a:t>
+            </a:r>
+            <a:r>
+              <a:rPr lang="fr-FR" sz="1400" dirty="0"/>
+              <a:t> </a:t>
+            </a:r>
+            <a:r>
+              <a:rPr lang="fr-FR" sz="1400" dirty="0" err="1"/>
+              <a:t>extends</a:t>
+            </a:r>
+            <a:r>
+              <a:rPr lang="fr-FR" sz="1400" dirty="0"/>
+              <a:t> Agent&lt;</a:t>
+            </a:r>
+            <a:r>
+              <a:rPr lang="fr-FR" sz="1400" dirty="0" err="1"/>
+              <a:t>AntHillExample</a:t>
+            </a:r>
+            <a:r>
+              <a:rPr lang="fr-FR" sz="1400" dirty="0"/>
+              <a:t>, </a:t>
+            </a:r>
+            <a:r>
+              <a:rPr lang="fr-FR" sz="1400" dirty="0" err="1"/>
+              <a:t>WorldExample</a:t>
+            </a:r>
+            <a:r>
+              <a:rPr lang="fr-FR" sz="1400" dirty="0"/>
+              <a:t>&gt; {</a:t>
+            </a:r>
+          </a:p>
+          <a:p>
+            <a:pPr marL="228600" lvl="1" indent="0">
+              <a:buNone/>
+            </a:pPr>
+            <a:r>
+              <a:rPr lang="fr-FR" sz="1200" dirty="0" err="1"/>
+              <a:t>private</a:t>
+            </a:r>
+            <a:r>
+              <a:rPr lang="fr-FR" sz="1200" dirty="0"/>
+              <a:t> double dx = 0,dy = 0;</a:t>
+            </a:r>
+          </a:p>
+          <a:p>
+            <a:pPr marL="228600" lvl="1" indent="0">
+              <a:buNone/>
+            </a:pPr>
+            <a:r>
+              <a:rPr lang="fr-FR" sz="1200" dirty="0" err="1"/>
+              <a:t>private</a:t>
+            </a:r>
+            <a:r>
+              <a:rPr lang="fr-FR" sz="1200" dirty="0"/>
+              <a:t> double angle = </a:t>
+            </a:r>
+            <a:r>
+              <a:rPr lang="fr-FR" sz="1200" dirty="0" err="1"/>
+              <a:t>Math.random</a:t>
+            </a:r>
+            <a:r>
+              <a:rPr lang="fr-FR" sz="1200" dirty="0"/>
+              <a:t>() * </a:t>
+            </a:r>
+            <a:r>
+              <a:rPr lang="fr-FR" sz="1200" dirty="0" err="1"/>
+              <a:t>Math.PI</a:t>
+            </a:r>
+            <a:r>
+              <a:rPr lang="fr-FR" sz="1200" dirty="0"/>
+              <a:t> * 2;</a:t>
+            </a:r>
+          </a:p>
+          <a:p>
+            <a:pPr marL="228600" lvl="1" indent="0">
+              <a:buNone/>
+            </a:pPr>
+            <a:r>
+              <a:rPr lang="fr-FR" sz="1200" dirty="0" err="1"/>
+              <a:t>private</a:t>
+            </a:r>
+            <a:r>
+              <a:rPr lang="fr-FR" sz="1200" dirty="0"/>
+              <a:t> </a:t>
+            </a:r>
+            <a:r>
+              <a:rPr lang="fr-FR" sz="1200" dirty="0" err="1"/>
+              <a:t>DrawableImage</a:t>
+            </a:r>
+            <a:r>
+              <a:rPr lang="fr-FR" sz="1200" dirty="0"/>
+              <a:t> image;</a:t>
+            </a:r>
+          </a:p>
+          <a:p>
+            <a:pPr marL="228600" lvl="1" indent="0">
+              <a:lnSpc>
+                <a:spcPct val="100000"/>
+              </a:lnSpc>
+              <a:buNone/>
+            </a:pPr>
+            <a:r>
+              <a:rPr lang="fr-FR" sz="1200" dirty="0"/>
+              <a:t>@</a:t>
+            </a:r>
+            <a:r>
+              <a:rPr lang="fr-FR" sz="1200" dirty="0" err="1"/>
+              <a:t>Override</a:t>
+            </a:r>
+            <a:endParaRPr lang="fr-FR" sz="1200" dirty="0"/>
+          </a:p>
+          <a:p>
+            <a:pPr marL="228600" lvl="1" indent="0">
+              <a:lnSpc>
+                <a:spcPct val="100000"/>
+              </a:lnSpc>
+              <a:buNone/>
+            </a:pPr>
+            <a:r>
+              <a:rPr lang="fr-FR" sz="1200" dirty="0" err="1"/>
+              <a:t>protected</a:t>
+            </a:r>
+            <a:r>
+              <a:rPr lang="fr-FR" sz="1200" dirty="0"/>
+              <a:t> </a:t>
+            </a:r>
+            <a:r>
+              <a:rPr lang="fr-FR" sz="1200" dirty="0" err="1"/>
+              <a:t>void</a:t>
+            </a:r>
+            <a:r>
+              <a:rPr lang="fr-FR" sz="1200" dirty="0"/>
+              <a:t> </a:t>
+            </a:r>
+            <a:r>
+              <a:rPr lang="fr-FR" sz="1200" dirty="0" err="1"/>
+              <a:t>onRenderingInitialization</a:t>
+            </a:r>
+            <a:r>
+              <a:rPr lang="fr-FR" sz="1200" dirty="0"/>
+              <a:t>() {</a:t>
+            </a:r>
+          </a:p>
+          <a:p>
+            <a:pPr marL="457200" lvl="2" indent="0">
+              <a:lnSpc>
+                <a:spcPct val="100000"/>
+              </a:lnSpc>
+              <a:buNone/>
+            </a:pPr>
+            <a:r>
+              <a:rPr lang="fr-FR" sz="1100" dirty="0"/>
+              <a:t>image = </a:t>
+            </a:r>
+            <a:r>
+              <a:rPr lang="fr-FR" sz="1100" dirty="0" err="1"/>
+              <a:t>VUI.get</a:t>
+            </a:r>
+            <a:r>
+              <a:rPr lang="fr-FR" sz="1100" dirty="0"/>
+              <a:t>().</a:t>
+            </a:r>
+            <a:r>
+              <a:rPr lang="fr-FR" sz="1100" dirty="0" err="1"/>
+              <a:t>createImage</a:t>
+            </a:r>
+            <a:r>
+              <a:rPr lang="fr-FR" sz="1100" dirty="0"/>
+              <a:t>(dx, </a:t>
+            </a:r>
+            <a:r>
+              <a:rPr lang="fr-FR" sz="1100" dirty="0" err="1"/>
+              <a:t>dy</a:t>
+            </a:r>
+            <a:r>
+              <a:rPr lang="fr-FR" sz="1100" dirty="0"/>
+              <a:t>, "</a:t>
+            </a:r>
+            <a:r>
+              <a:rPr lang="fr-FR" sz="1100" dirty="0" err="1"/>
+              <a:t>Resources</a:t>
+            </a:r>
+            <a:r>
+              <a:rPr lang="fr-FR" sz="1100" dirty="0"/>
+              <a:t>/</a:t>
+            </a:r>
+            <a:r>
+              <a:rPr lang="fr-FR" sz="1100" dirty="0" err="1"/>
+              <a:t>ant.png</a:t>
+            </a:r>
+            <a:r>
+              <a:rPr lang="fr-FR" sz="1100" dirty="0"/>
+              <a:t>");</a:t>
+            </a:r>
+          </a:p>
+          <a:p>
+            <a:pPr marL="228600" lvl="1" indent="0">
+              <a:lnSpc>
+                <a:spcPct val="100000"/>
+              </a:lnSpc>
+              <a:buNone/>
+            </a:pPr>
+            <a:r>
+              <a:rPr lang="fr-FR" sz="1200" dirty="0"/>
+              <a:t>}</a:t>
+            </a:r>
+          </a:p>
+          <a:p>
+            <a:pPr marL="228600" lvl="1" indent="0">
+              <a:lnSpc>
+                <a:spcPct val="100000"/>
+              </a:lnSpc>
+              <a:buNone/>
+            </a:pPr>
+            <a:r>
+              <a:rPr lang="fr-FR" sz="1200" dirty="0"/>
+              <a:t>@</a:t>
+            </a:r>
+            <a:r>
+              <a:rPr lang="fr-FR" sz="1200" dirty="0" err="1"/>
+              <a:t>Override</a:t>
+            </a:r>
+            <a:endParaRPr lang="fr-FR" sz="1200" dirty="0"/>
+          </a:p>
+          <a:p>
+            <a:pPr marL="228600" lvl="1" indent="0">
+              <a:lnSpc>
+                <a:spcPct val="100000"/>
+              </a:lnSpc>
+              <a:buNone/>
+            </a:pPr>
+            <a:r>
+              <a:rPr lang="fr-FR" sz="1200" dirty="0" err="1"/>
+              <a:t>protected</a:t>
+            </a:r>
+            <a:r>
+              <a:rPr lang="fr-FR" sz="1200" dirty="0"/>
+              <a:t> </a:t>
+            </a:r>
+            <a:r>
+              <a:rPr lang="fr-FR" sz="1200" dirty="0" err="1"/>
+              <a:t>void</a:t>
+            </a:r>
+            <a:r>
+              <a:rPr lang="fr-FR" sz="1200" dirty="0"/>
+              <a:t> </a:t>
+            </a:r>
+            <a:r>
+              <a:rPr lang="fr-FR" sz="1200" dirty="0" err="1"/>
+              <a:t>onUpdateRender</a:t>
+            </a:r>
+            <a:r>
+              <a:rPr lang="fr-FR" sz="1200" dirty="0"/>
+              <a:t>() {</a:t>
+            </a:r>
+          </a:p>
+          <a:p>
+            <a:pPr marL="457200" lvl="2" indent="0">
+              <a:lnSpc>
+                <a:spcPct val="100000"/>
+              </a:lnSpc>
+              <a:buNone/>
+            </a:pPr>
+            <a:r>
+              <a:rPr lang="fr-FR" sz="1100" dirty="0" err="1"/>
+              <a:t>image.move</a:t>
+            </a:r>
+            <a:r>
+              <a:rPr lang="fr-FR" sz="1100" dirty="0"/>
+              <a:t>(dx, </a:t>
+            </a:r>
+            <a:r>
+              <a:rPr lang="fr-FR" sz="1100" dirty="0" err="1"/>
+              <a:t>dy</a:t>
+            </a:r>
+            <a:r>
+              <a:rPr lang="fr-FR" sz="1100" dirty="0"/>
+              <a:t>);</a:t>
+            </a:r>
+          </a:p>
+          <a:p>
+            <a:pPr marL="457200" lvl="2" indent="0">
+              <a:lnSpc>
+                <a:spcPct val="100000"/>
+              </a:lnSpc>
+              <a:buNone/>
+            </a:pPr>
+            <a:r>
+              <a:rPr lang="fr-FR" sz="1100" dirty="0" err="1"/>
+              <a:t>image.setAngle</a:t>
+            </a:r>
+            <a:r>
+              <a:rPr lang="fr-FR" sz="1100" dirty="0"/>
+              <a:t>(angle);</a:t>
+            </a:r>
+          </a:p>
+          <a:p>
+            <a:pPr marL="228600" lvl="1" indent="0">
+              <a:lnSpc>
+                <a:spcPct val="100000"/>
+              </a:lnSpc>
+              <a:buNone/>
+            </a:pPr>
+            <a:r>
+              <a:rPr lang="fr-FR" sz="1200" dirty="0"/>
+              <a:t>}</a:t>
+            </a:r>
+          </a:p>
+          <a:p>
+            <a:pPr marL="0" indent="0">
+              <a:lnSpc>
+                <a:spcPct val="100000"/>
+              </a:lnSpc>
+              <a:buNone/>
+            </a:pPr>
+            <a:r>
+              <a:rPr lang="fr-FR" sz="1400" dirty="0"/>
+              <a:t>}</a:t>
+            </a:r>
+          </a:p>
+        </p:txBody>
+      </p:sp>
+      <p:sp>
+        <p:nvSpPr>
+          <p:cNvPr id="4" name="Espace réservé du contenu 3">
+            <a:extLst>
+              <a:ext uri="{FF2B5EF4-FFF2-40B4-BE49-F238E27FC236}">
+                <a16:creationId xmlns:a16="http://schemas.microsoft.com/office/drawing/2014/main" id="{592BABDF-A21C-3249-9AC2-6EE9B3A04001}"/>
+              </a:ext>
+            </a:extLst>
+          </p:cNvPr>
+          <p:cNvSpPr>
+            <a:spLocks noGrp="1"/>
+          </p:cNvSpPr>
+          <p:nvPr>
+            <p:ph sz="half" idx="2"/>
+          </p:nvPr>
+        </p:nvSpPr>
+        <p:spPr/>
+        <p:txBody>
+          <a:bodyPr>
+            <a:normAutofit fontScale="25000" lnSpcReduction="20000"/>
+          </a:bodyPr>
+          <a:lstStyle/>
+          <a:p>
+            <a:endParaRPr lang="fr-FR"/>
+          </a:p>
+        </p:txBody>
+      </p:sp>
+      <p:sp>
+        <p:nvSpPr>
+          <p:cNvPr id="5" name="Espace réservé de la date 4">
+            <a:extLst>
+              <a:ext uri="{FF2B5EF4-FFF2-40B4-BE49-F238E27FC236}">
+                <a16:creationId xmlns:a16="http://schemas.microsoft.com/office/drawing/2014/main" id="{E0BEE681-BBF9-014E-9B84-33EA5DA556D2}"/>
+              </a:ext>
+            </a:extLst>
+          </p:cNvPr>
+          <p:cNvSpPr>
+            <a:spLocks noGrp="1"/>
+          </p:cNvSpPr>
+          <p:nvPr>
+            <p:ph type="dt" sz="half" idx="10"/>
+          </p:nvPr>
+        </p:nvSpPr>
+        <p:spPr/>
+        <p:txBody>
+          <a:bodyPr/>
+          <a:lstStyle/>
+          <a:p>
+            <a:r>
+              <a:rPr lang="fr-FR"/>
+              <a:t>07/04/2017</a:t>
+            </a:r>
+            <a:endParaRPr lang="en-US"/>
+          </a:p>
+        </p:txBody>
+      </p:sp>
+      <p:sp>
+        <p:nvSpPr>
+          <p:cNvPr id="6" name="Espace réservé du pied de page 5">
+            <a:extLst>
+              <a:ext uri="{FF2B5EF4-FFF2-40B4-BE49-F238E27FC236}">
+                <a16:creationId xmlns:a16="http://schemas.microsoft.com/office/drawing/2014/main" id="{C8315A4B-5476-2A4A-9AF8-33F2FC6C36EB}"/>
+              </a:ext>
+            </a:extLst>
+          </p:cNvPr>
+          <p:cNvSpPr>
+            <a:spLocks noGrp="1"/>
+          </p:cNvSpPr>
+          <p:nvPr>
+            <p:ph type="ftr" sz="quarter" idx="11"/>
+          </p:nvPr>
+        </p:nvSpPr>
+        <p:spPr/>
+        <p:txBody>
+          <a:bodyPr/>
+          <a:lstStyle/>
+          <a:p>
+            <a:r>
+              <a:rPr lang="en-US"/>
+              <a:t>Framework Amak</a:t>
+            </a:r>
+            <a:endParaRPr lang="en-US" dirty="0"/>
+          </a:p>
+        </p:txBody>
+      </p:sp>
+      <p:sp>
+        <p:nvSpPr>
+          <p:cNvPr id="7" name="Espace réservé du numéro de diapositive 6">
+            <a:extLst>
+              <a:ext uri="{FF2B5EF4-FFF2-40B4-BE49-F238E27FC236}">
+                <a16:creationId xmlns:a16="http://schemas.microsoft.com/office/drawing/2014/main" id="{BD293E8B-874A-6A42-855F-BD6BC4E3A0C6}"/>
+              </a:ext>
+            </a:extLst>
+          </p:cNvPr>
+          <p:cNvSpPr>
+            <a:spLocks noGrp="1"/>
+          </p:cNvSpPr>
+          <p:nvPr>
+            <p:ph type="sldNum" sz="quarter" idx="12"/>
+          </p:nvPr>
+        </p:nvSpPr>
+        <p:spPr/>
+        <p:txBody>
+          <a:bodyPr/>
+          <a:lstStyle/>
+          <a:p>
+            <a:fld id="{E31375A4-56A4-47D6-9801-1991572033F7}" type="slidenum">
+              <a:rPr lang="en-US" smtClean="0"/>
+              <a:t>19</a:t>
+            </a:fld>
+            <a:endParaRPr lang="en-US"/>
+          </a:p>
+        </p:txBody>
+      </p:sp>
+    </p:spTree>
+    <p:extLst>
+      <p:ext uri="{BB962C8B-B14F-4D97-AF65-F5344CB8AC3E}">
+        <p14:creationId xmlns:p14="http://schemas.microsoft.com/office/powerpoint/2010/main" val="1632745646"/>
+      </p:ext>
+    </p:extLst>
+  </p:cSld>
+  <p:clrMapOvr>
+    <a:masterClrMapping/>
+  </p:clrMapOvr>
+  <mc:AlternateContent xmlns:mc="http://schemas.openxmlformats.org/markup-compatibility/2006" xmlns:p14="http://schemas.microsoft.com/office/powerpoint/2010/main">
+    <mc:Choice Requires="p14">
+      <p:transition spd="med" p14:dur="700">
+        <p:fade/>
+      </p:transition>
+    </mc:Choice>
+    <mc:Fallback xmlns="">
+      <p:transition spd="med">
+        <p:fade/>
+      </p:transition>
+    </mc:Fallback>
+  </mc:AlternateContent>
 </p:sld>
 </file>
 
@@ -19296,10 +19705,9 @@
           <a:lstStyle/>
           <a:p>
             <a:r>
-              <a:rPr lang="fr-FR" noProof="1" smtClean="0"/>
+              <a:rPr lang="fr-FR" noProof="1"/>
               <a:t>Système Multi-Agent (SMA)</a:t>
             </a:r>
-            <a:endParaRPr lang="fr-FR" noProof="1"/>
           </a:p>
         </p:txBody>
       </p:sp>
@@ -19333,7 +19741,7 @@
               <a:buChar char="▪"/>
             </a:pPr>
             <a:r>
-              <a:rPr lang="fr-FR" sz="2000" b="0" i="0" dirty="0" smtClean="0">
+              <a:rPr lang="fr-FR" sz="2000" b="0" i="0" dirty="0">
                 <a:solidFill>
                   <a:srgbClr val="2D2E2D"/>
                 </a:solidFill>
@@ -19354,7 +19762,7 @@
               <a:buChar char="▪"/>
             </a:pPr>
             <a:r>
-              <a:rPr lang="fr-FR" dirty="0" smtClean="0">
+              <a:rPr lang="fr-FR" dirty="0">
                 <a:solidFill>
                   <a:srgbClr val="2D2E2D"/>
                 </a:solidFill>
@@ -19375,7 +19783,7 @@
               <a:buChar char="▪"/>
             </a:pPr>
             <a:r>
-              <a:rPr lang="fr-FR" dirty="0" smtClean="0">
+              <a:rPr lang="fr-FR" dirty="0">
                 <a:solidFill>
                   <a:srgbClr val="2D2E2D"/>
                 </a:solidFill>
@@ -19393,7 +19801,7 @@
               <a:buChar char="▪"/>
             </a:pPr>
             <a:r>
-              <a:rPr lang="fr-FR" dirty="0" smtClean="0">
+              <a:rPr lang="fr-FR" dirty="0">
                 <a:solidFill>
                   <a:srgbClr val="2D2E2D"/>
                 </a:solidFill>
@@ -19411,7 +19819,7 @@
               <a:buChar char="▪"/>
             </a:pPr>
             <a:r>
-              <a:rPr lang="fr-FR" dirty="0" smtClean="0">
+              <a:rPr lang="fr-FR" dirty="0">
                 <a:solidFill>
                   <a:srgbClr val="2D2E2D"/>
                 </a:solidFill>
@@ -19429,7 +19837,7 @@
               <a:buChar char="▪"/>
             </a:pPr>
             <a:r>
-              <a:rPr lang="fr-FR" dirty="0" smtClean="0">
+              <a:rPr lang="fr-FR" dirty="0">
                 <a:solidFill>
                   <a:srgbClr val="2D2E2D"/>
                 </a:solidFill>
@@ -19447,7 +19855,7 @@
               <a:buChar char="▪"/>
             </a:pPr>
             <a:r>
-              <a:rPr lang="fr-FR" dirty="0" smtClean="0"/>
+              <a:rPr lang="fr-FR" dirty="0"/>
               <a:t>Évolue de manière indépendante du SMA et des agents</a:t>
             </a:r>
           </a:p>
@@ -19469,7 +19877,7 @@
           <a:lstStyle/>
           <a:p>
             <a:r>
-              <a:rPr lang="fr-FR" smtClean="0"/>
+              <a:rPr lang="fr-FR"/>
               <a:t>07/04/2017</a:t>
             </a:r>
             <a:endParaRPr lang="en-US"/>
@@ -19492,7 +19900,7 @@
           <a:lstStyle/>
           <a:p>
             <a:r>
-              <a:rPr lang="en-US" smtClean="0"/>
+              <a:rPr lang="en-US"/>
               <a:t>Framework Amak</a:t>
             </a:r>
             <a:endParaRPr lang="en-US" dirty="0"/>
@@ -19544,13 +19952,6 @@
       </p:transition>
     </mc:Fallback>
   </mc:AlternateContent>
-  <p:timing>
-    <p:tnLst>
-      <p:par>
-        <p:cTn id="1" dur="indefinite" restart="never" nodeType="tmRoot"/>
-      </p:par>
-    </p:tnLst>
-  </p:timing>
 </p:sld>
 </file>
 
@@ -19587,10 +19988,9 @@
           <a:lstStyle/>
           <a:p>
             <a:r>
-              <a:rPr lang="fr-FR" dirty="0" smtClean="0"/>
+              <a:rPr lang="fr-FR" dirty="0"/>
               <a:t>Conception d’un SMA en langage objet 1/4</a:t>
             </a:r>
-            <a:endParaRPr lang="fr-FR" dirty="0"/>
           </a:p>
         </p:txBody>
       </p:sp>
@@ -19616,15 +20016,15 @@
               <a:buAutoNum type="arabicPeriod"/>
             </a:pPr>
             <a:r>
-              <a:rPr lang="fr-FR" dirty="0" smtClean="0"/>
+              <a:rPr lang="fr-FR" dirty="0"/>
               <a:t>Création d’une classe </a:t>
             </a:r>
             <a:r>
-              <a:rPr lang="fr-FR" dirty="0" err="1" smtClean="0"/>
+              <a:rPr lang="fr-FR" dirty="0" err="1"/>
               <a:t>MonSMA</a:t>
             </a:r>
             <a:r>
-              <a:rPr lang="fr-FR" dirty="0" smtClean="0"/>
+              <a:rPr lang="fr-FR" dirty="0"/>
               <a:t> qui contient les agents</a:t>
             </a:r>
           </a:p>
@@ -19634,15 +20034,15 @@
               <a:buAutoNum type="arabicPeriod"/>
             </a:pPr>
             <a:r>
-              <a:rPr lang="fr-FR" dirty="0" smtClean="0"/>
+              <a:rPr lang="fr-FR" dirty="0"/>
               <a:t>Création d’une classe </a:t>
             </a:r>
             <a:r>
-              <a:rPr lang="fr-FR" dirty="0" err="1" smtClean="0"/>
+              <a:rPr lang="fr-FR" dirty="0" err="1"/>
               <a:t>MonAgent</a:t>
             </a:r>
             <a:r>
-              <a:rPr lang="fr-FR" dirty="0" smtClean="0"/>
+              <a:rPr lang="fr-FR" dirty="0"/>
               <a:t> qui contient</a:t>
             </a:r>
           </a:p>
@@ -19652,7 +20052,7 @@
               <a:buAutoNum type="arabicPeriod"/>
             </a:pPr>
             <a:r>
-              <a:rPr lang="fr-FR" dirty="0" smtClean="0"/>
+              <a:rPr lang="fr-FR" dirty="0"/>
               <a:t>Trois méthodes : perception, décision, action.</a:t>
             </a:r>
           </a:p>
@@ -19662,15 +20062,15 @@
               <a:buAutoNum type="arabicPeriod"/>
             </a:pPr>
             <a:r>
-              <a:rPr lang="fr-FR" dirty="0" smtClean="0"/>
+              <a:rPr lang="fr-FR" dirty="0"/>
               <a:t>Création d’une classe </a:t>
             </a:r>
             <a:r>
-              <a:rPr lang="fr-FR" dirty="0" err="1" smtClean="0"/>
+              <a:rPr lang="fr-FR" dirty="0" err="1"/>
               <a:t>MonEnvironnement</a:t>
             </a:r>
             <a:r>
-              <a:rPr lang="fr-FR" dirty="0" smtClean="0"/>
+              <a:rPr lang="fr-FR" dirty="0"/>
               <a:t> qui contient</a:t>
             </a:r>
           </a:p>
@@ -19680,10 +20080,9 @@
               <a:buAutoNum type="arabicPeriod"/>
             </a:pPr>
             <a:r>
-              <a:rPr lang="fr-FR" dirty="0" smtClean="0"/>
+              <a:rPr lang="fr-FR" dirty="0"/>
               <a:t>Une méthode cycle</a:t>
             </a:r>
-            <a:endParaRPr lang="fr-FR" dirty="0"/>
           </a:p>
         </p:txBody>
       </p:sp>
@@ -19732,7 +20131,7 @@
           <a:lstStyle/>
           <a:p>
             <a:r>
-              <a:rPr lang="fr-FR" smtClean="0"/>
+              <a:rPr lang="fr-FR"/>
               <a:t>07/04/2017</a:t>
             </a:r>
             <a:endParaRPr lang="en-US"/>
@@ -19755,7 +20154,7 @@
           <a:lstStyle/>
           <a:p>
             <a:r>
-              <a:rPr lang="en-US" smtClean="0"/>
+              <a:rPr lang="en-US"/>
               <a:t>Framework Amak</a:t>
             </a:r>
             <a:endParaRPr lang="en-US" dirty="0"/>
@@ -19807,13 +20206,6 @@
       </p:transition>
     </mc:Fallback>
   </mc:AlternateContent>
-  <p:timing>
-    <p:tnLst>
-      <p:par>
-        <p:cTn id="1" dur="indefinite" restart="never" nodeType="tmRoot"/>
-      </p:par>
-    </p:tnLst>
-  </p:timing>
 </p:sld>
 </file>
 
@@ -19851,13 +20243,8 @@
           <a:p>
             <a:r>
               <a:rPr lang="fr-FR" dirty="0"/>
-              <a:t>Conception d’un SMA en langage objet </a:t>
-            </a:r>
-            <a:r>
-              <a:rPr lang="fr-FR" dirty="0" smtClean="0"/>
-              <a:t>2/4</a:t>
-            </a:r>
-            <a:endParaRPr lang="fr-FR" dirty="0"/>
+              <a:t>Conception d’un SMA en langage objet 2/4</a:t>
+            </a:r>
           </a:p>
         </p:txBody>
       </p:sp>
@@ -19882,33 +20269,32 @@
           <a:lstStyle/>
           <a:p>
             <a:r>
-              <a:rPr lang="fr-FR" dirty="0" smtClean="0"/>
+              <a:rPr lang="fr-FR" dirty="0"/>
               <a:t>Création d’une méthode main</a:t>
             </a:r>
           </a:p>
           <a:p>
             <a:r>
-              <a:rPr lang="fr-FR" dirty="0" smtClean="0"/>
+              <a:rPr lang="fr-FR" dirty="0"/>
               <a:t>Création des agents</a:t>
             </a:r>
           </a:p>
           <a:p>
             <a:r>
-              <a:rPr lang="fr-FR" dirty="0" smtClean="0"/>
+              <a:rPr lang="fr-FR" dirty="0"/>
               <a:t>Ajouts des agents au </a:t>
             </a:r>
             <a:r>
-              <a:rPr lang="fr-FR" dirty="0" err="1" smtClean="0"/>
+              <a:rPr lang="fr-FR" dirty="0" err="1"/>
               <a:t>sma</a:t>
             </a:r>
-            <a:endParaRPr lang="fr-FR" dirty="0" smtClean="0"/>
-          </a:p>
-          <a:p>
-            <a:r>
-              <a:rPr lang="fr-FR" dirty="0" smtClean="0"/>
+            <a:endParaRPr lang="fr-FR" dirty="0"/>
+          </a:p>
+          <a:p>
+            <a:r>
+              <a:rPr lang="fr-FR" dirty="0"/>
               <a:t>Exécution cycle par cycle des agents et de l’environnement</a:t>
             </a:r>
-            <a:endParaRPr lang="fr-FR" dirty="0"/>
           </a:p>
         </p:txBody>
       </p:sp>
@@ -19957,7 +20343,7 @@
           <a:lstStyle/>
           <a:p>
             <a:r>
-              <a:rPr lang="fr-FR" smtClean="0"/>
+              <a:rPr lang="fr-FR"/>
               <a:t>07/04/2017</a:t>
             </a:r>
             <a:endParaRPr lang="en-US"/>
@@ -19980,7 +20366,7 @@
           <a:lstStyle/>
           <a:p>
             <a:r>
-              <a:rPr lang="en-US" smtClean="0"/>
+              <a:rPr lang="en-US"/>
               <a:t>Framework Amak</a:t>
             </a:r>
             <a:endParaRPr lang="en-US" dirty="0"/>
@@ -20032,13 +20418,6 @@
       </p:transition>
     </mc:Fallback>
   </mc:AlternateContent>
-  <p:timing>
-    <p:tnLst>
-      <p:par>
-        <p:cTn id="1" dur="indefinite" restart="never" nodeType="tmRoot"/>
-      </p:par>
-    </p:tnLst>
-  </p:timing>
 </p:sld>
 </file>
 
@@ -20076,13 +20455,8 @@
           <a:p>
             <a:r>
               <a:rPr lang="fr-FR" dirty="0"/>
-              <a:t>Conception d’un SMA en langage objet </a:t>
-            </a:r>
-            <a:r>
-              <a:rPr lang="fr-FR" dirty="0" smtClean="0"/>
-              <a:t>3/4</a:t>
-            </a:r>
-            <a:endParaRPr lang="fr-FR" dirty="0"/>
+              <a:t>Conception d’un SMA en langage objet 3/4</a:t>
+            </a:r>
           </a:p>
         </p:txBody>
       </p:sp>
@@ -20109,89 +20483,89 @@
           <a:lstStyle/>
           <a:p>
             <a:r>
-              <a:rPr lang="fr-FR" dirty="0" smtClean="0"/>
+              <a:rPr lang="fr-FR" dirty="0"/>
               <a:t>Besoin de visualiser l’état de valeurs</a:t>
             </a:r>
           </a:p>
           <a:p>
             <a:pPr lvl="1"/>
             <a:r>
-              <a:rPr lang="fr-FR" dirty="0" smtClean="0"/>
+              <a:rPr lang="fr-FR" dirty="0"/>
               <a:t>Ajout de </a:t>
             </a:r>
             <a:r>
-              <a:rPr lang="fr-FR" dirty="0" err="1" smtClean="0"/>
+              <a:rPr lang="fr-FR" dirty="0" err="1"/>
               <a:t>jfreechart</a:t>
             </a:r>
             <a:r>
-              <a:rPr lang="fr-FR" dirty="0" smtClean="0"/>
+              <a:rPr lang="fr-FR" dirty="0"/>
               <a:t> (difficile à prendre en main, très verbeux, incompatible avec les clusters de calcul)</a:t>
             </a:r>
           </a:p>
           <a:p>
             <a:r>
-              <a:rPr lang="fr-FR" dirty="0" smtClean="0"/>
+              <a:rPr lang="fr-FR" dirty="0"/>
               <a:t>Besoin de contrôler l’exécution</a:t>
             </a:r>
           </a:p>
           <a:p>
             <a:pPr lvl="1"/>
             <a:r>
-              <a:rPr lang="fr-FR" dirty="0" smtClean="0"/>
+              <a:rPr lang="fr-FR" dirty="0"/>
               <a:t>Ajout d’un </a:t>
             </a:r>
             <a:r>
-              <a:rPr lang="fr-FR" dirty="0" err="1" smtClean="0"/>
+              <a:rPr lang="fr-FR" dirty="0" err="1"/>
               <a:t>Thread.sleep</a:t>
             </a:r>
-            <a:endParaRPr lang="fr-FR" dirty="0" smtClean="0"/>
+            <a:endParaRPr lang="fr-FR" dirty="0"/>
           </a:p>
           <a:p>
             <a:pPr lvl="2"/>
             <a:r>
-              <a:rPr lang="fr-FR" dirty="0" smtClean="0"/>
+              <a:rPr lang="fr-FR" dirty="0"/>
               <a:t>Problème pas à pas</a:t>
             </a:r>
           </a:p>
           <a:p>
             <a:pPr lvl="1"/>
             <a:r>
-              <a:rPr lang="fr-FR" dirty="0" smtClean="0"/>
+              <a:rPr lang="fr-FR" dirty="0"/>
               <a:t>Ou création d’un </a:t>
             </a:r>
             <a:r>
-              <a:rPr lang="fr-FR" dirty="0" err="1" smtClean="0"/>
+              <a:rPr lang="fr-FR" dirty="0" err="1"/>
               <a:t>scheduler</a:t>
             </a:r>
             <a:r>
-              <a:rPr lang="fr-FR" dirty="0" smtClean="0"/>
+              <a:rPr lang="fr-FR" dirty="0"/>
               <a:t> sur mesure</a:t>
             </a:r>
           </a:p>
           <a:p>
             <a:pPr lvl="2"/>
             <a:r>
-              <a:rPr lang="fr-FR" dirty="0" smtClean="0"/>
+              <a:rPr lang="fr-FR" dirty="0"/>
               <a:t>Problème de synchronisation</a:t>
             </a:r>
           </a:p>
           <a:p>
             <a:pPr lvl="2"/>
             <a:r>
-              <a:rPr lang="fr-FR" dirty="0" smtClean="0"/>
+              <a:rPr lang="fr-FR" dirty="0"/>
               <a:t>Risque de double exécution</a:t>
             </a:r>
           </a:p>
           <a:p>
             <a:pPr lvl="2"/>
             <a:r>
-              <a:rPr lang="fr-FR" dirty="0" smtClean="0"/>
+              <a:rPr lang="fr-FR" dirty="0"/>
               <a:t>Besoin d’exécuter du code en fin de résolution</a:t>
             </a:r>
           </a:p>
           <a:p>
             <a:pPr lvl="1"/>
-            <a:endParaRPr lang="fr-FR" dirty="0" smtClean="0"/>
+            <a:endParaRPr lang="fr-FR" dirty="0"/>
           </a:p>
           <a:p>
             <a:endParaRPr lang="fr-FR" dirty="0"/>
@@ -20243,7 +20617,7 @@
           <a:lstStyle/>
           <a:p>
             <a:r>
-              <a:rPr lang="fr-FR" smtClean="0"/>
+              <a:rPr lang="fr-FR"/>
               <a:t>07/04/2017</a:t>
             </a:r>
             <a:endParaRPr lang="en-US"/>
@@ -20266,7 +20640,7 @@
           <a:lstStyle/>
           <a:p>
             <a:r>
-              <a:rPr lang="en-US" smtClean="0"/>
+              <a:rPr lang="en-US"/>
               <a:t>Framework Amak</a:t>
             </a:r>
             <a:endParaRPr lang="en-US" dirty="0"/>
@@ -20318,13 +20692,6 @@
       </p:transition>
     </mc:Fallback>
   </mc:AlternateContent>
-  <p:timing>
-    <p:tnLst>
-      <p:par>
-        <p:cTn id="1" dur="indefinite" restart="never" nodeType="tmRoot"/>
-      </p:par>
-    </p:tnLst>
-  </p:timing>
 </p:sld>
 </file>
 
@@ -20362,13 +20729,8 @@
           <a:p>
             <a:r>
               <a:rPr lang="fr-FR" dirty="0"/>
-              <a:t>Conception d’un SMA en langage objet 4</a:t>
-            </a:r>
-            <a:r>
-              <a:rPr lang="fr-FR" dirty="0" smtClean="0"/>
-              <a:t>/4</a:t>
-            </a:r>
-            <a:endParaRPr lang="fr-FR" dirty="0"/>
+              <a:t>Conception d’un SMA en langage objet 4/4</a:t>
+            </a:r>
           </a:p>
         </p:txBody>
       </p:sp>
@@ -20544,10 +20906,9 @@
           <a:p>
             <a:pPr algn="ctr"/>
             <a:r>
-              <a:rPr lang="fr-FR" dirty="0" smtClean="0"/>
+              <a:rPr lang="fr-FR" dirty="0"/>
               <a:t>Processus compliqué et répété à chaque nouveau SMA</a:t>
             </a:r>
-            <a:endParaRPr lang="fr-FR" dirty="0"/>
           </a:p>
         </p:txBody>
       </p:sp>
@@ -20567,7 +20928,7 @@
           <a:lstStyle/>
           <a:p>
             <a:r>
-              <a:rPr lang="fr-FR" smtClean="0"/>
+              <a:rPr lang="fr-FR"/>
               <a:t>07/04/2017</a:t>
             </a:r>
             <a:endParaRPr lang="en-US"/>
@@ -20590,7 +20951,7 @@
           <a:lstStyle/>
           <a:p>
             <a:r>
-              <a:rPr lang="en-US" smtClean="0"/>
+              <a:rPr lang="en-US"/>
               <a:t>Framework Amak</a:t>
             </a:r>
             <a:endParaRPr lang="en-US" dirty="0"/>
@@ -20764,7 +21125,7 @@
           <a:lstStyle/>
           <a:p>
             <a:r>
-              <a:rPr lang="fr-FR" dirty="0" err="1" smtClean="0"/>
+              <a:rPr lang="fr-FR" dirty="0" err="1"/>
               <a:t>Amak</a:t>
             </a:r>
             <a:endParaRPr lang="fr-FR" dirty="0"/>
@@ -20812,13 +21173,6 @@
       </p:transition>
     </mc:Fallback>
   </mc:AlternateContent>
-  <p:timing>
-    <p:tnLst>
-      <p:par>
-        <p:cTn id="1" dur="indefinite" restart="never" nodeType="tmRoot"/>
-      </p:par>
-    </p:tnLst>
-  </p:timing>
 </p:sld>
 </file>
 
@@ -20855,18 +21209,17 @@
           <a:lstStyle/>
           <a:p>
             <a:r>
-              <a:rPr lang="fr-FR" dirty="0" smtClean="0"/>
+              <a:rPr lang="fr-FR" dirty="0"/>
               <a:t>Qu’est ce qu’</a:t>
             </a:r>
             <a:r>
-              <a:rPr lang="fr-FR" dirty="0" err="1" smtClean="0"/>
+              <a:rPr lang="fr-FR" dirty="0" err="1"/>
               <a:t>Amak</a:t>
             </a:r>
             <a:r>
-              <a:rPr lang="fr-FR" dirty="0" smtClean="0"/>
+              <a:rPr lang="fr-FR" dirty="0"/>
               <a:t> ?</a:t>
             </a:r>
-            <a:endParaRPr lang="fr-FR" dirty="0"/>
           </a:p>
         </p:txBody>
       </p:sp>
@@ -20886,99 +21239,99 @@
           <a:lstStyle/>
           <a:p>
             <a:r>
-              <a:rPr lang="fr-FR" dirty="0" err="1" smtClean="0"/>
+              <a:rPr lang="fr-FR" dirty="0" err="1"/>
               <a:t>Amak</a:t>
             </a:r>
             <a:r>
-              <a:rPr lang="fr-FR" dirty="0" smtClean="0"/>
+              <a:rPr lang="fr-FR" dirty="0"/>
               <a:t> est un patron de conception permettant la simplification de la création et de la maintenance des systèmes multi-agents</a:t>
             </a:r>
           </a:p>
           <a:p>
-            <a:endParaRPr lang="fr-FR" dirty="0" smtClean="0"/>
-          </a:p>
-          <a:p>
-            <a:r>
-              <a:rPr lang="fr-FR" dirty="0" smtClean="0"/>
+            <a:endParaRPr lang="fr-FR" dirty="0"/>
+          </a:p>
+          <a:p>
+            <a:r>
+              <a:rPr lang="fr-FR" dirty="0"/>
               <a:t>Concrètement</a:t>
             </a:r>
           </a:p>
           <a:p>
             <a:pPr lvl="1"/>
             <a:r>
-              <a:rPr lang="fr-FR" dirty="0" smtClean="0"/>
+              <a:rPr lang="fr-FR" dirty="0"/>
               <a:t>Librairie (fichier JAR) à importer dans le projet Java</a:t>
             </a:r>
           </a:p>
           <a:p>
             <a:pPr lvl="2"/>
             <a:r>
-              <a:rPr lang="fr-FR" dirty="0" smtClean="0"/>
+              <a:rPr lang="fr-FR" dirty="0"/>
               <a:t>Clic droit -&gt; </a:t>
             </a:r>
             <a:r>
-              <a:rPr lang="fr-FR" dirty="0" err="1" smtClean="0"/>
+              <a:rPr lang="fr-FR" dirty="0" err="1"/>
               <a:t>Build</a:t>
             </a:r>
             <a:r>
-              <a:rPr lang="fr-FR" dirty="0" smtClean="0"/>
+              <a:rPr lang="fr-FR" dirty="0"/>
               <a:t> </a:t>
             </a:r>
             <a:r>
-              <a:rPr lang="fr-FR" dirty="0" err="1" smtClean="0"/>
+              <a:rPr lang="fr-FR" dirty="0" err="1"/>
               <a:t>path</a:t>
             </a:r>
             <a:r>
-              <a:rPr lang="fr-FR" dirty="0" smtClean="0"/>
+              <a:rPr lang="fr-FR" dirty="0"/>
               <a:t> -&gt; </a:t>
             </a:r>
             <a:r>
-              <a:rPr lang="fr-FR" dirty="0" err="1" smtClean="0"/>
+              <a:rPr lang="fr-FR" dirty="0" err="1"/>
               <a:t>Add</a:t>
             </a:r>
             <a:r>
-              <a:rPr lang="fr-FR" dirty="0" smtClean="0"/>
+              <a:rPr lang="fr-FR" dirty="0"/>
               <a:t> to </a:t>
             </a:r>
             <a:r>
-              <a:rPr lang="fr-FR" dirty="0" err="1" smtClean="0"/>
+              <a:rPr lang="fr-FR" dirty="0" err="1"/>
               <a:t>build</a:t>
             </a:r>
             <a:r>
-              <a:rPr lang="fr-FR" dirty="0" smtClean="0"/>
+              <a:rPr lang="fr-FR" dirty="0"/>
               <a:t> </a:t>
             </a:r>
             <a:r>
-              <a:rPr lang="fr-FR" dirty="0" err="1" smtClean="0"/>
+              <a:rPr lang="fr-FR" dirty="0" err="1"/>
               <a:t>path</a:t>
             </a:r>
             <a:r>
-              <a:rPr lang="fr-FR" dirty="0" smtClean="0"/>
+              <a:rPr lang="fr-FR" dirty="0"/>
               <a:t> …</a:t>
             </a:r>
           </a:p>
           <a:p>
             <a:pPr lvl="1"/>
             <a:r>
-              <a:rPr lang="fr-FR" dirty="0" smtClean="0"/>
+              <a:rPr lang="fr-FR" dirty="0"/>
               <a:t>Classes et méthodes à surcharger</a:t>
             </a:r>
           </a:p>
           <a:p>
             <a:pPr lvl="1"/>
             <a:r>
-              <a:rPr lang="fr-FR" dirty="0" smtClean="0"/>
+              <a:rPr lang="fr-FR" dirty="0"/>
               <a:t>Librairies faciles d’utilisation packagées avec </a:t>
             </a:r>
             <a:r>
-              <a:rPr lang="fr-FR" dirty="0" err="1" smtClean="0"/>
+              <a:rPr lang="fr-FR" dirty="0" err="1"/>
               <a:t>Amak</a:t>
             </a:r>
             <a:endParaRPr lang="fr-FR" dirty="0"/>
           </a:p>
           <a:p>
             <a:pPr lvl="1"/>
-            <a:endParaRPr lang="fr-FR" dirty="0" smtClean="0"/>
+            <a:endParaRPr lang="fr-FR" dirty="0"/>
           </a:p>
         </p:txBody>
       </p:sp>
@@ -20998,7 +21351,7 @@
           <a:lstStyle/>
           <a:p>
             <a:r>
-              <a:rPr lang="fr-FR" smtClean="0"/>
+              <a:rPr lang="fr-FR"/>
               <a:t>07/04/2017</a:t>
             </a:r>
             <a:endParaRPr lang="en-US"/>
@@ -21021,7 +21374,7 @@
           <a:lstStyle/>
           <a:p>
             <a:r>
-              <a:rPr lang="en-US" smtClean="0"/>
+              <a:rPr lang="en-US"/>
               <a:t>Framework Amak</a:t>
             </a:r>
             <a:endParaRPr lang="en-US" dirty="0"/>
@@ -21073,13 +21426,6 @@
       </p:transition>
     </mc:Fallback>
   </mc:AlternateContent>
-  <p:timing>
-    <p:tnLst>
-      <p:par>
-        <p:cTn id="1" dur="indefinite" restart="never" nodeType="tmRoot"/>
-      </p:par>
-    </p:tnLst>
-  </p:timing>
 </p:sld>
 </file>
 
@@ -21116,10 +21462,9 @@
           <a:lstStyle/>
           <a:p>
             <a:r>
-              <a:rPr lang="fr-FR" dirty="0" smtClean="0"/>
+              <a:rPr lang="fr-FR" dirty="0"/>
               <a:t>Exemple de classes et méthodes à surcharger</a:t>
             </a:r>
-            <a:endParaRPr lang="fr-FR" dirty="0"/>
           </a:p>
         </p:txBody>
       </p:sp>
@@ -21144,37 +21489,37 @@
           <a:lstStyle/>
           <a:p>
             <a:r>
-              <a:rPr lang="en-US" dirty="0" err="1" smtClean="0"/>
+              <a:rPr lang="en-US" dirty="0" err="1"/>
               <a:t>Amas</a:t>
             </a:r>
             <a:r>
-              <a:rPr lang="en-US" dirty="0" smtClean="0"/>
+              <a:rPr lang="en-US" dirty="0"/>
               <a:t>&lt;E extends </a:t>
             </a:r>
             <a:r>
-              <a:rPr lang="en-US" dirty="0" err="1" smtClean="0"/>
+              <a:rPr lang="en-US" dirty="0" err="1"/>
               <a:t>Environnement</a:t>
             </a:r>
             <a:r>
-              <a:rPr lang="en-US" dirty="0" smtClean="0"/>
+              <a:rPr lang="en-US" dirty="0"/>
               <a:t>&gt;</a:t>
             </a:r>
           </a:p>
           <a:p>
             <a:pPr lvl="1"/>
             <a:r>
-              <a:rPr lang="fr-FR" dirty="0" err="1" smtClean="0"/>
+              <a:rPr lang="fr-FR" dirty="0" err="1"/>
               <a:t>onInitialAgentsCreation</a:t>
             </a:r>
-            <a:endParaRPr lang="fr-FR" dirty="0" smtClean="0"/>
+            <a:endParaRPr lang="fr-FR" dirty="0"/>
           </a:p>
           <a:p>
             <a:pPr lvl="1"/>
             <a:r>
-              <a:rPr lang="fr-FR" dirty="0" err="1" smtClean="0"/>
+              <a:rPr lang="fr-FR" dirty="0" err="1"/>
               <a:t>onSystemCycleEnd</a:t>
             </a:r>
-            <a:endParaRPr lang="fr-FR" dirty="0" smtClean="0"/>
+            <a:endParaRPr lang="fr-FR" dirty="0"/>
           </a:p>
           <a:p>
             <a:pPr lvl="1"/>
@@ -21209,12 +21554,8 @@
           <a:lstStyle/>
           <a:p>
             <a:r>
-              <a:rPr lang="en-US" dirty="0" smtClean="0"/>
-              <a:t>Agent&lt;A </a:t>
-            </a:r>
-            <a:r>
               <a:rPr lang="en-US" dirty="0"/>
-              <a:t>extends </a:t>
+              <a:t>Agent&lt;A extends </a:t>
             </a:r>
             <a:r>
               <a:rPr lang="en-US" dirty="0" err="1"/>
@@ -21222,68 +21563,56 @@
             </a:r>
             <a:r>
               <a:rPr lang="en-US" dirty="0"/>
-              <a:t>&lt;E&gt;, E extends </a:t>
-            </a:r>
-            <a:r>
-              <a:rPr lang="en-US" dirty="0" smtClean="0"/>
-              <a:t>Environment&gt;</a:t>
+              <a:t>&lt;E&gt;, E extends Environment&gt;</a:t>
             </a:r>
           </a:p>
           <a:p>
             <a:pPr lvl="1"/>
             <a:r>
-              <a:rPr lang="fr-FR" dirty="0" err="1" smtClean="0"/>
+              <a:rPr lang="fr-FR" dirty="0" err="1"/>
               <a:t>computeCriticality</a:t>
             </a:r>
-            <a:endParaRPr lang="fr-FR" dirty="0" smtClean="0"/>
+            <a:endParaRPr lang="fr-FR" dirty="0"/>
           </a:p>
           <a:p>
             <a:pPr lvl="1"/>
             <a:r>
-              <a:rPr lang="fr-FR" dirty="0" err="1" smtClean="0"/>
+              <a:rPr lang="fr-FR" dirty="0" err="1"/>
               <a:t>onPerceive</a:t>
             </a:r>
-            <a:endParaRPr lang="fr-FR" dirty="0" smtClean="0"/>
+            <a:endParaRPr lang="fr-FR" dirty="0"/>
           </a:p>
           <a:p>
             <a:pPr lvl="1"/>
             <a:r>
-              <a:rPr lang="fr-FR" dirty="0" err="1" smtClean="0"/>
+              <a:rPr lang="fr-FR" dirty="0" err="1"/>
               <a:t>onDecide</a:t>
             </a:r>
-            <a:endParaRPr lang="fr-FR" dirty="0" smtClean="0"/>
+            <a:endParaRPr lang="fr-FR" dirty="0"/>
           </a:p>
           <a:p>
             <a:pPr lvl="1"/>
             <a:r>
-              <a:rPr lang="fr-FR" dirty="0" err="1" smtClean="0"/>
+              <a:rPr lang="fr-FR" dirty="0" err="1"/>
               <a:t>onAct</a:t>
             </a:r>
-            <a:endParaRPr lang="fr-FR" dirty="0" smtClean="0"/>
+            <a:endParaRPr lang="fr-FR" dirty="0"/>
           </a:p>
           <a:p>
             <a:pPr lvl="1"/>
             <a:r>
-              <a:rPr lang="fr-FR" dirty="0" err="1" smtClean="0"/>
+              <a:rPr lang="fr-FR" dirty="0" err="1"/>
               <a:t>onReady</a:t>
             </a:r>
-            <a:endParaRPr lang="fr-FR" dirty="0" smtClean="0"/>
+            <a:endParaRPr lang="fr-FR" dirty="0"/>
           </a:p>
           <a:p>
             <a:pPr lvl="1"/>
             <a:r>
-              <a:rPr lang="en-US" dirty="0" err="1" smtClean="0"/>
+              <a:rPr lang="en-US" dirty="0" err="1"/>
               <a:t>onAgentCycleBegin</a:t>
             </a:r>
-            <a:endParaRPr lang="fr-FR" dirty="0" smtClean="0"/>
-          </a:p>
-          <a:p>
-            <a:pPr lvl="1"/>
-            <a:r>
-              <a:rPr lang="fr-FR" dirty="0" err="1" smtClean="0"/>
-              <a:t>onSystemCycleBegin</a:t>
-            </a:r>
-            <a:endParaRPr lang="fr-FR" dirty="0" smtClean="0"/>
+            <a:endParaRPr lang="fr-FR" dirty="0"/>
           </a:p>
         </p:txBody>
       </p:sp>
@@ -21308,26 +21637,26 @@
           <a:lstStyle/>
           <a:p>
             <a:r>
-              <a:rPr lang="fr-FR" dirty="0" err="1" smtClean="0"/>
+              <a:rPr lang="fr-FR" dirty="0" err="1"/>
               <a:t>Environment</a:t>
             </a:r>
-            <a:endParaRPr lang="fr-FR" dirty="0" smtClean="0"/>
+            <a:endParaRPr lang="fr-FR" dirty="0"/>
           </a:p>
           <a:p>
             <a:pPr lvl="1"/>
             <a:r>
-              <a:rPr lang="fr-FR" dirty="0" err="1" smtClean="0"/>
+              <a:rPr lang="fr-FR" dirty="0" err="1"/>
               <a:t>onInitialization</a:t>
             </a:r>
-            <a:endParaRPr lang="fr-FR" dirty="0" smtClean="0"/>
+            <a:endParaRPr lang="fr-FR" dirty="0"/>
           </a:p>
           <a:p>
             <a:pPr lvl="1"/>
             <a:r>
-              <a:rPr lang="fr-FR" dirty="0" err="1" smtClean="0"/>
+              <a:rPr lang="fr-FR" dirty="0" err="1"/>
               <a:t>onCycleBegin</a:t>
             </a:r>
-            <a:endParaRPr lang="fr-FR" dirty="0" smtClean="0"/>
+            <a:endParaRPr lang="fr-FR" dirty="0"/>
           </a:p>
           <a:p>
             <a:pPr lvl="1"/>
@@ -21335,7 +21664,7 @@
               <a:rPr lang="fr-FR" dirty="0" err="1"/>
               <a:t>onCycleEnd</a:t>
             </a:r>
-            <a:endParaRPr lang="fr-FR" dirty="0" smtClean="0"/>
+            <a:endParaRPr lang="fr-FR" dirty="0"/>
           </a:p>
         </p:txBody>
       </p:sp>
@@ -21355,7 +21684,7 @@
           <a:lstStyle/>
           <a:p>
             <a:r>
-              <a:rPr lang="fr-FR" smtClean="0"/>
+              <a:rPr lang="fr-FR"/>
               <a:t>07/04/2017</a:t>
             </a:r>
             <a:endParaRPr lang="en-US"/>
@@ -21378,7 +21707,7 @@
           <a:lstStyle/>
           <a:p>
             <a:r>
-              <a:rPr lang="en-US" smtClean="0"/>
+              <a:rPr lang="en-US"/>
               <a:t>Framework Amak</a:t>
             </a:r>
             <a:endParaRPr lang="en-US" dirty="0"/>
@@ -21430,13 +21759,6 @@
       </p:transition>
     </mc:Fallback>
   </mc:AlternateContent>
-  <p:timing>
-    <p:tnLst>
-      <p:par>
-        <p:cTn id="1" dur="indefinite" restart="never" nodeType="tmRoot"/>
-      </p:par>
-    </p:tnLst>
-  </p:timing>
 </p:sld>
 </file>
 

</xml_diff>